<commit_message>
updated lect 4 slides to cover only class coverage
</commit_message>
<xml_diff>
--- a/docs/lecture_slides/Week 3/Week3_Lecture4_Slides_1_22_2024.pptx
+++ b/docs/lecture_slides/Week 3/Week3_Lecture4_Slides_1_22_2024.pptx
@@ -23,14 +23,6 @@
     <p:sldId id="339" r:id="rId17"/>
     <p:sldId id="309" r:id="rId18"/>
     <p:sldId id="308" r:id="rId19"/>
-    <p:sldId id="303" r:id="rId20"/>
-    <p:sldId id="259" r:id="rId21"/>
-    <p:sldId id="313" r:id="rId22"/>
-    <p:sldId id="314" r:id="rId23"/>
-    <p:sldId id="315" r:id="rId24"/>
-    <p:sldId id="316" r:id="rId25"/>
-    <p:sldId id="317" r:id="rId26"/>
-    <p:sldId id="283" r:id="rId27"/>
   </p:sldIdLst>
   <p:sldSz cx="12192000" cy="6858000"/>
   <p:notesSz cx="6858000" cy="9144000"/>
@@ -3708,13 +3700,7 @@
                       <a:rPr lang="en-US" b="0" i="1" smtClean="0">
                         <a:latin typeface="Cambria Math" panose="02040503050406030204" pitchFamily="18" charset="0"/>
                       </a:rPr>
-                      <m:t>={1, 3, 5, 5, 6, 7, 7,</m:t>
-                    </m:r>
-                    <m:r>
-                      <a:rPr lang="en-US" i="1">
-                        <a:latin typeface="Cambria Math" panose="02040503050406030204" pitchFamily="18" charset="0"/>
-                      </a:rPr>
-                      <m:t> 8}</m:t>
+                      <m:t>={1, 3, 5, 5, 6, 7, 7, 8}</m:t>
                     </m:r>
                   </m:oMath>
                 </a14:m>
@@ -5525,13 +5511,7 @@
                         <a:rPr lang="en-US" sz="2400" b="0" i="1" smtClean="0">
                           <a:latin typeface="Cambria Math" panose="02040503050406030204" pitchFamily="18" charset="0"/>
                         </a:rPr>
-                        <m:t>={1, 3, 5, 5, 6, 7, 7,</m:t>
-                      </m:r>
-                      <m:r>
-                        <a:rPr lang="en-US" sz="2400" i="1">
-                          <a:latin typeface="Cambria Math" panose="02040503050406030204" pitchFamily="18" charset="0"/>
-                        </a:rPr>
-                        <m:t> 8}</m:t>
+                        <m:t>={1, 3, 5, 5, 6, 7, 7, 8}</m:t>
                       </m:r>
                     </m:oMath>
                   </m:oMathPara>
@@ -7399,94 +7379,6 @@
 </p:sld>
 </file>
 
-<file path=ppt/slides/slide19.xml><?xml version="1.0" encoding="utf-8"?>
-<p:sld xmlns:a="http://schemas.openxmlformats.org/drawingml/2006/main" xmlns:r="http://schemas.openxmlformats.org/officeDocument/2006/relationships" xmlns:p="http://schemas.openxmlformats.org/presentationml/2006/main">
-  <p:cSld>
-    <p:spTree>
-      <p:nvGrpSpPr>
-        <p:cNvPr id="1" name=""/>
-        <p:cNvGrpSpPr/>
-        <p:nvPr/>
-      </p:nvGrpSpPr>
-      <p:grpSpPr>
-        <a:xfrm>
-          <a:off x="0" y="0"/>
-          <a:ext cx="0" cy="0"/>
-          <a:chOff x="0" y="0"/>
-          <a:chExt cx="0" cy="0"/>
-        </a:xfrm>
-      </p:grpSpPr>
-      <p:sp>
-        <p:nvSpPr>
-          <p:cNvPr id="2" name="Title 1">
-            <a:extLst>
-              <a:ext uri="{FF2B5EF4-FFF2-40B4-BE49-F238E27FC236}">
-                <a16:creationId xmlns:a16="http://schemas.microsoft.com/office/drawing/2014/main" id="{96B6764E-1650-762B-5308-1049092EAE9A}"/>
-              </a:ext>
-            </a:extLst>
-          </p:cNvPr>
-          <p:cNvSpPr>
-            <a:spLocks noGrp="1"/>
-          </p:cNvSpPr>
-          <p:nvPr>
-            <p:ph type="title"/>
-          </p:nvPr>
-        </p:nvSpPr>
-        <p:spPr/>
-        <p:txBody>
-          <a:bodyPr/>
-          <a:lstStyle/>
-          <a:p>
-            <a:r>
-              <a:rPr lang="en-US" dirty="0"/>
-              <a:t>Variability of A Distribution: Measures of Spread</a:t>
-            </a:r>
-          </a:p>
-        </p:txBody>
-      </p:sp>
-      <p:pic>
-        <p:nvPicPr>
-          <p:cNvPr id="7" name="Picture 6">
-            <a:extLst>
-              <a:ext uri="{FF2B5EF4-FFF2-40B4-BE49-F238E27FC236}">
-                <a16:creationId xmlns:a16="http://schemas.microsoft.com/office/drawing/2014/main" id="{A2F4481B-DAA2-3B91-063C-978376309A11}"/>
-              </a:ext>
-            </a:extLst>
-          </p:cNvPr>
-          <p:cNvPicPr>
-            <a:picLocks noChangeAspect="1"/>
-          </p:cNvPicPr>
-          <p:nvPr/>
-        </p:nvPicPr>
-        <p:blipFill>
-          <a:blip r:embed="rId2"/>
-          <a:stretch>
-            <a:fillRect/>
-          </a:stretch>
-        </p:blipFill>
-        <p:spPr>
-          <a:xfrm>
-            <a:off x="2498689" y="1771748"/>
-            <a:ext cx="8783276" cy="4810796"/>
-          </a:xfrm>
-          <a:prstGeom prst="rect">
-            <a:avLst/>
-          </a:prstGeom>
-        </p:spPr>
-      </p:pic>
-    </p:spTree>
-    <p:extLst>
-      <p:ext uri="{BB962C8B-B14F-4D97-AF65-F5344CB8AC3E}">
-        <p14:creationId xmlns:p14="http://schemas.microsoft.com/office/powerpoint/2010/main" val="2464089419"/>
-      </p:ext>
-    </p:extLst>
-  </p:cSld>
-  <p:clrMapOvr>
-    <a:masterClrMapping/>
-  </p:clrMapOvr>
-</p:sld>
-</file>
-
 <file path=ppt/slides/slide2.xml><?xml version="1.0" encoding="utf-8"?>
 <p:sld xmlns:a="http://schemas.openxmlformats.org/drawingml/2006/main" xmlns:r="http://schemas.openxmlformats.org/officeDocument/2006/relationships" xmlns:p="http://schemas.openxmlformats.org/presentationml/2006/main">
   <p:cSld>
@@ -7641,3697 +7533,6 @@
     <p:extLst>
       <p:ext uri="{BB962C8B-B14F-4D97-AF65-F5344CB8AC3E}">
         <p14:creationId xmlns:p14="http://schemas.microsoft.com/office/powerpoint/2010/main" val="132781913"/>
-      </p:ext>
-    </p:extLst>
-  </p:cSld>
-  <p:clrMapOvr>
-    <a:masterClrMapping/>
-  </p:clrMapOvr>
-</p:sld>
-</file>
-
-<file path=ppt/slides/slide20.xml><?xml version="1.0" encoding="utf-8"?>
-<p:sld xmlns:a="http://schemas.openxmlformats.org/drawingml/2006/main" xmlns:r="http://schemas.openxmlformats.org/officeDocument/2006/relationships" xmlns:p="http://schemas.openxmlformats.org/presentationml/2006/main">
-  <p:cSld>
-    <p:spTree>
-      <p:nvGrpSpPr>
-        <p:cNvPr id="1" name=""/>
-        <p:cNvGrpSpPr/>
-        <p:nvPr/>
-      </p:nvGrpSpPr>
-      <p:grpSpPr>
-        <a:xfrm>
-          <a:off x="0" y="0"/>
-          <a:ext cx="0" cy="0"/>
-          <a:chOff x="0" y="0"/>
-          <a:chExt cx="0" cy="0"/>
-        </a:xfrm>
-      </p:grpSpPr>
-      <p:pic>
-        <p:nvPicPr>
-          <p:cNvPr id="7" name="Picture 6">
-            <a:extLst>
-              <a:ext uri="{FF2B5EF4-FFF2-40B4-BE49-F238E27FC236}">
-                <a16:creationId xmlns:a16="http://schemas.microsoft.com/office/drawing/2014/main" id="{32D83D08-E688-A516-345A-2BA8AFF8552E}"/>
-              </a:ext>
-            </a:extLst>
-          </p:cNvPr>
-          <p:cNvPicPr>
-            <a:picLocks noChangeAspect="1"/>
-          </p:cNvPicPr>
-          <p:nvPr/>
-        </p:nvPicPr>
-        <p:blipFill>
-          <a:blip r:embed="rId2"/>
-          <a:stretch>
-            <a:fillRect/>
-          </a:stretch>
-        </p:blipFill>
-        <p:spPr>
-          <a:xfrm>
-            <a:off x="6373323" y="3687010"/>
-            <a:ext cx="5685913" cy="3170990"/>
-          </a:xfrm>
-          <a:prstGeom prst="rect">
-            <a:avLst/>
-          </a:prstGeom>
-        </p:spPr>
-      </p:pic>
-      <p:sp>
-        <p:nvSpPr>
-          <p:cNvPr id="3" name="Content Placeholder 2">
-            <a:extLst>
-              <a:ext uri="{FF2B5EF4-FFF2-40B4-BE49-F238E27FC236}">
-                <a16:creationId xmlns:a16="http://schemas.microsoft.com/office/drawing/2014/main" id="{08F83EFD-680B-07F4-94B1-411EFE5D3C50}"/>
-              </a:ext>
-            </a:extLst>
-          </p:cNvPr>
-          <p:cNvSpPr>
-            <a:spLocks noGrp="1"/>
-          </p:cNvSpPr>
-          <p:nvPr>
-            <p:ph idx="1"/>
-          </p:nvPr>
-        </p:nvSpPr>
-        <p:spPr>
-          <a:xfrm>
-            <a:off x="351834" y="1825625"/>
-            <a:ext cx="5257800" cy="4667250"/>
-          </a:xfrm>
-        </p:spPr>
-        <p:txBody>
-          <a:bodyPr>
-            <a:normAutofit fontScale="77500" lnSpcReduction="20000"/>
-          </a:bodyPr>
-          <a:lstStyle/>
-          <a:p>
-            <a:r>
-              <a:rPr lang="en-US" dirty="0"/>
-              <a:t>The </a:t>
-            </a:r>
-            <a:r>
-              <a:rPr lang="en-US" b="1" dirty="0"/>
-              <a:t>range</a:t>
-            </a:r>
-            <a:r>
-              <a:rPr lang="en-US" dirty="0"/>
-              <a:t> is a measure of the distance between the smallest and largest values in the data</a:t>
-            </a:r>
-          </a:p>
-          <a:p>
-            <a:endParaRPr lang="en-US" dirty="0"/>
-          </a:p>
-          <a:p>
-            <a:pPr marL="457200" lvl="1" indent="0">
-              <a:buNone/>
-            </a:pPr>
-            <a:r>
-              <a:rPr lang="en-US" dirty="0"/>
-              <a:t>The range can be computed with only two data points the minimum value and maximum value</a:t>
-            </a:r>
-          </a:p>
-          <a:p>
-            <a:endParaRPr lang="en-US" dirty="0"/>
-          </a:p>
-          <a:p>
-            <a:r>
-              <a:rPr lang="en-US" dirty="0"/>
-              <a:t>If the range of a set of data is large, then the data vary more</a:t>
-            </a:r>
-          </a:p>
-          <a:p>
-            <a:endParaRPr lang="en-US" dirty="0"/>
-          </a:p>
-          <a:p>
-            <a:r>
-              <a:rPr lang="en-US" dirty="0"/>
-              <a:t>The range is </a:t>
-            </a:r>
-            <a:r>
-              <a:rPr lang="en-US" u="sng" dirty="0"/>
-              <a:t>severely</a:t>
-            </a:r>
-            <a:r>
-              <a:rPr lang="en-US" dirty="0"/>
-              <a:t> affected by the presence of outliers</a:t>
-            </a:r>
-          </a:p>
-          <a:p>
-            <a:endParaRPr lang="en-US" dirty="0"/>
-          </a:p>
-          <a:p>
-            <a:r>
-              <a:rPr lang="en-US" dirty="0"/>
-              <a:t>We typically </a:t>
-            </a:r>
-            <a:r>
-              <a:rPr lang="en-US" u="sng" dirty="0"/>
-              <a:t>do not</a:t>
-            </a:r>
-            <a:r>
-              <a:rPr lang="en-US" dirty="0"/>
-              <a:t> use the range to measure variability</a:t>
-            </a:r>
-          </a:p>
-        </p:txBody>
-      </p:sp>
-      <p:pic>
-        <p:nvPicPr>
-          <p:cNvPr id="5" name="Picture 4">
-            <a:extLst>
-              <a:ext uri="{FF2B5EF4-FFF2-40B4-BE49-F238E27FC236}">
-                <a16:creationId xmlns:a16="http://schemas.microsoft.com/office/drawing/2014/main" id="{36C44C54-000D-E381-2205-131B79AD8FA5}"/>
-              </a:ext>
-            </a:extLst>
-          </p:cNvPr>
-          <p:cNvPicPr>
-            <a:picLocks noChangeAspect="1"/>
-          </p:cNvPicPr>
-          <p:nvPr/>
-        </p:nvPicPr>
-        <p:blipFill>
-          <a:blip r:embed="rId3"/>
-          <a:stretch>
-            <a:fillRect/>
-          </a:stretch>
-        </p:blipFill>
-        <p:spPr>
-          <a:xfrm>
-            <a:off x="6373324" y="942974"/>
-            <a:ext cx="5466842" cy="3138827"/>
-          </a:xfrm>
-          <a:prstGeom prst="rect">
-            <a:avLst/>
-          </a:prstGeom>
-        </p:spPr>
-      </p:pic>
-      <p:sp>
-        <p:nvSpPr>
-          <p:cNvPr id="2" name="Title 1">
-            <a:extLst>
-              <a:ext uri="{FF2B5EF4-FFF2-40B4-BE49-F238E27FC236}">
-                <a16:creationId xmlns:a16="http://schemas.microsoft.com/office/drawing/2014/main" id="{2D084E88-7278-810D-D713-71E32243F66B}"/>
-              </a:ext>
-            </a:extLst>
-          </p:cNvPr>
-          <p:cNvSpPr>
-            <a:spLocks noGrp="1"/>
-          </p:cNvSpPr>
-          <p:nvPr>
-            <p:ph type="title"/>
-          </p:nvPr>
-        </p:nvSpPr>
-        <p:spPr/>
-        <p:txBody>
-          <a:bodyPr/>
-          <a:lstStyle/>
-          <a:p>
-            <a:r>
-              <a:rPr lang="en-US" dirty="0"/>
-              <a:t>Measures of Spread: Range</a:t>
-            </a:r>
-          </a:p>
-        </p:txBody>
-      </p:sp>
-    </p:spTree>
-    <p:extLst>
-      <p:ext uri="{BB962C8B-B14F-4D97-AF65-F5344CB8AC3E}">
-        <p14:creationId xmlns:p14="http://schemas.microsoft.com/office/powerpoint/2010/main" val="3729869338"/>
-      </p:ext>
-    </p:extLst>
-  </p:cSld>
-  <p:clrMapOvr>
-    <a:masterClrMapping/>
-  </p:clrMapOvr>
-</p:sld>
-</file>
-
-<file path=ppt/slides/slide21.xml><?xml version="1.0" encoding="utf-8"?>
-<p:sld xmlns:a="http://schemas.openxmlformats.org/drawingml/2006/main" xmlns:r="http://schemas.openxmlformats.org/officeDocument/2006/relationships" xmlns:p="http://schemas.openxmlformats.org/presentationml/2006/main">
-  <p:cSld>
-    <p:spTree>
-      <p:nvGrpSpPr>
-        <p:cNvPr id="1" name=""/>
-        <p:cNvGrpSpPr/>
-        <p:nvPr/>
-      </p:nvGrpSpPr>
-      <p:grpSpPr>
-        <a:xfrm>
-          <a:off x="0" y="0"/>
-          <a:ext cx="0" cy="0"/>
-          <a:chOff x="0" y="0"/>
-          <a:chExt cx="0" cy="0"/>
-        </a:xfrm>
-      </p:grpSpPr>
-      <p:sp>
-        <p:nvSpPr>
-          <p:cNvPr id="2" name="Title 1">
-            <a:extLst>
-              <a:ext uri="{FF2B5EF4-FFF2-40B4-BE49-F238E27FC236}">
-                <a16:creationId xmlns:a16="http://schemas.microsoft.com/office/drawing/2014/main" id="{1E74CF04-6A9A-C024-DDD4-4EA11F99DAD9}"/>
-              </a:ext>
-            </a:extLst>
-          </p:cNvPr>
-          <p:cNvSpPr>
-            <a:spLocks noGrp="1"/>
-          </p:cNvSpPr>
-          <p:nvPr>
-            <p:ph type="title"/>
-          </p:nvPr>
-        </p:nvSpPr>
-        <p:spPr/>
-        <p:txBody>
-          <a:bodyPr/>
-          <a:lstStyle/>
-          <a:p>
-            <a:r>
-              <a:rPr lang="en-US" dirty="0"/>
-              <a:t>Measures of Spread: Deviation </a:t>
-            </a:r>
-          </a:p>
-        </p:txBody>
-      </p:sp>
-      <mc:AlternateContent xmlns:mc="http://schemas.openxmlformats.org/markup-compatibility/2006" xmlns:a14="http://schemas.microsoft.com/office/drawing/2010/main">
-        <mc:Choice Requires="a14">
-          <p:sp>
-            <p:nvSpPr>
-              <p:cNvPr id="3" name="Content Placeholder 2">
-                <a:extLst>
-                  <a:ext uri="{FF2B5EF4-FFF2-40B4-BE49-F238E27FC236}">
-                    <a16:creationId xmlns:a16="http://schemas.microsoft.com/office/drawing/2014/main" id="{30F7291A-45D9-8440-5889-A0D10595CB60}"/>
-                  </a:ext>
-                </a:extLst>
-              </p:cNvPr>
-              <p:cNvSpPr>
-                <a:spLocks noGrp="1"/>
-              </p:cNvSpPr>
-              <p:nvPr>
-                <p:ph idx="1"/>
-              </p:nvPr>
-            </p:nvSpPr>
-            <p:spPr>
-              <a:xfrm>
-                <a:off x="838200" y="1825625"/>
-                <a:ext cx="10267950" cy="4351338"/>
-              </a:xfrm>
-            </p:spPr>
-            <p:txBody>
-              <a:bodyPr>
-                <a:normAutofit/>
-              </a:bodyPr>
-              <a:lstStyle/>
-              <a:p>
-                <a:r>
-                  <a:rPr lang="en-US" dirty="0"/>
-                  <a:t>A better measure of variability that uses </a:t>
-                </a:r>
-                <a:r>
-                  <a:rPr lang="en-US" i="1" dirty="0"/>
-                  <a:t>all</a:t>
-                </a:r>
-                <a:r>
-                  <a:rPr lang="en-US" dirty="0"/>
-                  <a:t> the data is based on </a:t>
-                </a:r>
-                <a:r>
-                  <a:rPr lang="en-US" b="1" dirty="0"/>
-                  <a:t>deviations</a:t>
-                </a:r>
-                <a:endParaRPr lang="en-US" dirty="0"/>
-              </a:p>
-              <a:p>
-                <a:endParaRPr lang="en-US" dirty="0"/>
-              </a:p>
-              <a:p>
-                <a:r>
-                  <a:rPr lang="en-US" b="1" dirty="0"/>
-                  <a:t>deviations</a:t>
-                </a:r>
-                <a:r>
-                  <a:rPr lang="en-US" dirty="0"/>
-                  <a:t> are the </a:t>
-                </a:r>
-                <a:r>
-                  <a:rPr lang="en-US" u="sng" dirty="0"/>
-                  <a:t>distances</a:t>
-                </a:r>
-                <a:r>
-                  <a:rPr lang="en-US" dirty="0"/>
-                  <a:t> of each value from the mean of the data:</a:t>
-                </a:r>
-              </a:p>
-              <a:p>
-                <a:pPr marL="914400" lvl="2" indent="0">
-                  <a:buNone/>
-                </a:pPr>
-                <a:r>
-                  <a:rPr lang="en-US" sz="2400" b="0" dirty="0"/>
-                  <a:t>Deviation of an observation</a:t>
-                </a:r>
-                <a14:m>
-                  <m:oMath xmlns:m="http://schemas.openxmlformats.org/officeDocument/2006/math">
-                    <m:r>
-                      <a:rPr lang="en-US" sz="2400" b="0" i="1" smtClean="0">
-                        <a:latin typeface="Cambria Math" panose="02040503050406030204" pitchFamily="18" charset="0"/>
-                      </a:rPr>
-                      <m:t> </m:t>
-                    </m:r>
-                    <m:sSub>
-                      <m:sSubPr>
-                        <m:ctrlPr>
-                          <a:rPr lang="en-US" sz="2400" b="0" i="1" smtClean="0">
-                            <a:latin typeface="Cambria Math" panose="02040503050406030204" pitchFamily="18" charset="0"/>
-                          </a:rPr>
-                        </m:ctrlPr>
-                      </m:sSubPr>
-                      <m:e>
-                        <m:r>
-                          <a:rPr lang="en-US" sz="2400" b="0" i="1" smtClean="0">
-                            <a:latin typeface="Cambria Math" panose="02040503050406030204" pitchFamily="18" charset="0"/>
-                          </a:rPr>
-                          <m:t>𝑥</m:t>
-                        </m:r>
-                      </m:e>
-                      <m:sub>
-                        <m:r>
-                          <a:rPr lang="en-US" sz="2400" b="0" i="1" smtClean="0">
-                            <a:latin typeface="Cambria Math" panose="02040503050406030204" pitchFamily="18" charset="0"/>
-                          </a:rPr>
-                          <m:t>𝑖</m:t>
-                        </m:r>
-                      </m:sub>
-                    </m:sSub>
-                    <m:r>
-                      <a:rPr lang="en-US" sz="2400" b="0" i="1" smtClean="0">
-                        <a:latin typeface="Cambria Math" panose="02040503050406030204" pitchFamily="18" charset="0"/>
-                      </a:rPr>
-                      <m:t>=(</m:t>
-                    </m:r>
-                    <m:sSub>
-                      <m:sSubPr>
-                        <m:ctrlPr>
-                          <a:rPr lang="en-US" sz="2400" b="0" i="1" smtClean="0">
-                            <a:latin typeface="Cambria Math" panose="02040503050406030204" pitchFamily="18" charset="0"/>
-                          </a:rPr>
-                        </m:ctrlPr>
-                      </m:sSubPr>
-                      <m:e>
-                        <m:r>
-                          <a:rPr lang="en-US" sz="2400" b="0" i="1" smtClean="0">
-                            <a:latin typeface="Cambria Math" panose="02040503050406030204" pitchFamily="18" charset="0"/>
-                          </a:rPr>
-                          <m:t>𝑥</m:t>
-                        </m:r>
-                      </m:e>
-                      <m:sub>
-                        <m:r>
-                          <a:rPr lang="en-US" sz="2400" b="0" i="1" smtClean="0">
-                            <a:latin typeface="Cambria Math" panose="02040503050406030204" pitchFamily="18" charset="0"/>
-                          </a:rPr>
-                          <m:t>𝑖</m:t>
-                        </m:r>
-                      </m:sub>
-                    </m:sSub>
-                    <m:r>
-                      <a:rPr lang="en-US" sz="2400" b="0" i="1" smtClean="0">
-                        <a:latin typeface="Cambria Math" panose="02040503050406030204" pitchFamily="18" charset="0"/>
-                      </a:rPr>
-                      <m:t> −</m:t>
-                    </m:r>
-                    <m:acc>
-                      <m:accPr>
-                        <m:chr m:val="̅"/>
-                        <m:ctrlPr>
-                          <a:rPr lang="en-US" sz="2400" b="0" i="1" smtClean="0">
-                            <a:latin typeface="Cambria Math" panose="02040503050406030204" pitchFamily="18" charset="0"/>
-                          </a:rPr>
-                        </m:ctrlPr>
-                      </m:accPr>
-                      <m:e>
-                        <m:r>
-                          <a:rPr lang="en-US" sz="2400" b="0" i="1" smtClean="0">
-                            <a:latin typeface="Cambria Math" panose="02040503050406030204" pitchFamily="18" charset="0"/>
-                          </a:rPr>
-                          <m:t>𝑥</m:t>
-                        </m:r>
-                      </m:e>
-                    </m:acc>
-                    <m:r>
-                      <a:rPr lang="en-US" sz="2400" b="0" i="1" smtClean="0">
-                        <a:latin typeface="Cambria Math" panose="02040503050406030204" pitchFamily="18" charset="0"/>
-                      </a:rPr>
-                      <m:t>)</m:t>
-                    </m:r>
-                  </m:oMath>
-                </a14:m>
-                <a:endParaRPr lang="en-US" sz="2400" dirty="0"/>
-              </a:p>
-              <a:p>
-                <a:pPr marL="914400" lvl="2" indent="0">
-                  <a:buNone/>
-                </a:pPr>
-                <a:endParaRPr lang="en-US" dirty="0"/>
-              </a:p>
-              <a:p>
-                <a:r>
-                  <a:rPr lang="en-US" dirty="0"/>
-                  <a:t>Every observation will have a deviation from the mean</a:t>
-                </a:r>
-              </a:p>
-              <a:p>
-                <a:endParaRPr lang="en-US" dirty="0"/>
-              </a:p>
-              <a:p>
-                <a:endParaRPr lang="en-US" dirty="0"/>
-              </a:p>
-              <a:p>
-                <a:endParaRPr lang="en-US" dirty="0"/>
-              </a:p>
-              <a:p>
-                <a:endParaRPr lang="en-US" dirty="0"/>
-              </a:p>
-            </p:txBody>
-          </p:sp>
-        </mc:Choice>
-        <mc:Fallback xmlns="">
-          <p:sp>
-            <p:nvSpPr>
-              <p:cNvPr id="3" name="Content Placeholder 2">
-                <a:extLst>
-                  <a:ext uri="{FF2B5EF4-FFF2-40B4-BE49-F238E27FC236}">
-                    <a16:creationId xmlns:a16="http://schemas.microsoft.com/office/drawing/2014/main" id="{30F7291A-45D9-8440-5889-A0D10595CB60}"/>
-                  </a:ext>
-                </a:extLst>
-              </p:cNvPr>
-              <p:cNvSpPr>
-                <a:spLocks noGrp="1" noRot="1" noChangeAspect="1" noMove="1" noResize="1" noEditPoints="1" noAdjustHandles="1" noChangeArrowheads="1" noChangeShapeType="1" noTextEdit="1"/>
-              </p:cNvSpPr>
-              <p:nvPr>
-                <p:ph idx="1"/>
-              </p:nvPr>
-            </p:nvSpPr>
-            <p:spPr>
-              <a:xfrm>
-                <a:off x="838200" y="1825625"/>
-                <a:ext cx="10267950" cy="4351338"/>
-              </a:xfrm>
-              <a:blipFill>
-                <a:blip r:embed="rId2"/>
-                <a:stretch>
-                  <a:fillRect l="-1069" t="-2241"/>
-                </a:stretch>
-              </a:blipFill>
-            </p:spPr>
-            <p:txBody>
-              <a:bodyPr/>
-              <a:lstStyle/>
-              <a:p>
-                <a:r>
-                  <a:rPr lang="en-US">
-                    <a:noFill/>
-                  </a:rPr>
-                  <a:t> </a:t>
-                </a:r>
-              </a:p>
-            </p:txBody>
-          </p:sp>
-        </mc:Fallback>
-      </mc:AlternateContent>
-    </p:spTree>
-    <p:extLst>
-      <p:ext uri="{BB962C8B-B14F-4D97-AF65-F5344CB8AC3E}">
-        <p14:creationId xmlns:p14="http://schemas.microsoft.com/office/powerpoint/2010/main" val="1541885009"/>
-      </p:ext>
-    </p:extLst>
-  </p:cSld>
-  <p:clrMapOvr>
-    <a:masterClrMapping/>
-  </p:clrMapOvr>
-</p:sld>
-</file>
-
-<file path=ppt/slides/slide22.xml><?xml version="1.0" encoding="utf-8"?>
-<p:sld xmlns:a="http://schemas.openxmlformats.org/drawingml/2006/main" xmlns:r="http://schemas.openxmlformats.org/officeDocument/2006/relationships" xmlns:p="http://schemas.openxmlformats.org/presentationml/2006/main">
-  <p:cSld>
-    <p:spTree>
-      <p:nvGrpSpPr>
-        <p:cNvPr id="1" name=""/>
-        <p:cNvGrpSpPr/>
-        <p:nvPr/>
-      </p:nvGrpSpPr>
-      <p:grpSpPr>
-        <a:xfrm>
-          <a:off x="0" y="0"/>
-          <a:ext cx="0" cy="0"/>
-          <a:chOff x="0" y="0"/>
-          <a:chExt cx="0" cy="0"/>
-        </a:xfrm>
-      </p:grpSpPr>
-      <p:pic>
-        <p:nvPicPr>
-          <p:cNvPr id="7" name="Picture 6">
-            <a:extLst>
-              <a:ext uri="{FF2B5EF4-FFF2-40B4-BE49-F238E27FC236}">
-                <a16:creationId xmlns:a16="http://schemas.microsoft.com/office/drawing/2014/main" id="{0AD4BAC8-DF07-082E-EBA7-3A6128B34D84}"/>
-              </a:ext>
-            </a:extLst>
-          </p:cNvPr>
-          <p:cNvPicPr>
-            <a:picLocks noChangeAspect="1"/>
-          </p:cNvPicPr>
-          <p:nvPr/>
-        </p:nvPicPr>
-        <p:blipFill>
-          <a:blip r:embed="rId2"/>
-          <a:stretch>
-            <a:fillRect/>
-          </a:stretch>
-        </p:blipFill>
-        <p:spPr>
-          <a:xfrm>
-            <a:off x="838200" y="748882"/>
-            <a:ext cx="10306050" cy="5743993"/>
-          </a:xfrm>
-          <a:prstGeom prst="rect">
-            <a:avLst/>
-          </a:prstGeom>
-        </p:spPr>
-      </p:pic>
-      <p:sp>
-        <p:nvSpPr>
-          <p:cNvPr id="14" name="TextBox 13">
-            <a:extLst>
-              <a:ext uri="{FF2B5EF4-FFF2-40B4-BE49-F238E27FC236}">
-                <a16:creationId xmlns:a16="http://schemas.microsoft.com/office/drawing/2014/main" id="{2256D99A-7249-27F8-2F8D-EA0FC4B870BA}"/>
-              </a:ext>
-            </a:extLst>
-          </p:cNvPr>
-          <p:cNvSpPr txBox="1"/>
-          <p:nvPr/>
-        </p:nvSpPr>
-        <p:spPr>
-          <a:xfrm>
-            <a:off x="8899976" y="538404"/>
-            <a:ext cx="2632900" cy="400110"/>
-          </a:xfrm>
-          <a:prstGeom prst="rect">
-            <a:avLst/>
-          </a:prstGeom>
-          <a:noFill/>
-        </p:spPr>
-        <p:txBody>
-          <a:bodyPr wrap="none" rtlCol="0">
-            <a:spAutoFit/>
-          </a:bodyPr>
-          <a:lstStyle/>
-          <a:p>
-            <a:r>
-              <a:rPr lang="en-US" sz="2000" b="1" dirty="0">
-                <a:solidFill>
-                  <a:srgbClr val="0070C0"/>
-                </a:solidFill>
-              </a:rPr>
-              <a:t>Rice </a:t>
-            </a:r>
-            <a:r>
-              <a:rPr lang="en-US" sz="2000" b="1" dirty="0" err="1">
-                <a:solidFill>
-                  <a:srgbClr val="0070C0"/>
-                </a:solidFill>
-              </a:rPr>
-              <a:t>Krispes</a:t>
-            </a:r>
-            <a:r>
-              <a:rPr lang="en-US" sz="2000" b="1" dirty="0">
-                <a:solidFill>
-                  <a:srgbClr val="0070C0"/>
-                </a:solidFill>
-              </a:rPr>
-              <a:t> = 340 (mg)</a:t>
-            </a:r>
-          </a:p>
-        </p:txBody>
-      </p:sp>
-      <p:sp>
-        <p:nvSpPr>
-          <p:cNvPr id="15" name="TextBox 14">
-            <a:extLst>
-              <a:ext uri="{FF2B5EF4-FFF2-40B4-BE49-F238E27FC236}">
-                <a16:creationId xmlns:a16="http://schemas.microsoft.com/office/drawing/2014/main" id="{358554AD-23CC-6BD4-2F40-8A6ED06437AB}"/>
-              </a:ext>
-            </a:extLst>
-          </p:cNvPr>
-          <p:cNvSpPr txBox="1"/>
-          <p:nvPr/>
-        </p:nvSpPr>
-        <p:spPr>
-          <a:xfrm>
-            <a:off x="4998805" y="443992"/>
-            <a:ext cx="1984839" cy="400110"/>
-          </a:xfrm>
-          <a:prstGeom prst="rect">
-            <a:avLst/>
-          </a:prstGeom>
-          <a:noFill/>
-        </p:spPr>
-        <p:txBody>
-          <a:bodyPr wrap="none" rtlCol="0">
-            <a:spAutoFit/>
-          </a:bodyPr>
-          <a:lstStyle/>
-          <a:p>
-            <a:r>
-              <a:rPr lang="en-US" sz="2000" b="1" dirty="0">
-                <a:solidFill>
-                  <a:srgbClr val="FF0000"/>
-                </a:solidFill>
-              </a:rPr>
-              <a:t>Mean = 167 (mg)</a:t>
-            </a:r>
-          </a:p>
-        </p:txBody>
-      </p:sp>
-      <p:sp>
-        <p:nvSpPr>
-          <p:cNvPr id="16" name="Right Brace 15">
-            <a:extLst>
-              <a:ext uri="{FF2B5EF4-FFF2-40B4-BE49-F238E27FC236}">
-                <a16:creationId xmlns:a16="http://schemas.microsoft.com/office/drawing/2014/main" id="{A4E7E84C-0911-1392-D0D5-DA31D45F4D32}"/>
-              </a:ext>
-            </a:extLst>
-          </p:cNvPr>
-          <p:cNvSpPr/>
-          <p:nvPr/>
-        </p:nvSpPr>
-        <p:spPr>
-          <a:xfrm rot="16200000">
-            <a:off x="8100087" y="738701"/>
-            <a:ext cx="249796" cy="4257966"/>
-          </a:xfrm>
-          <a:prstGeom prst="rightBrace">
-            <a:avLst/>
-          </a:prstGeom>
-          <a:ln w="38100">
-            <a:solidFill>
-              <a:schemeClr val="tx1"/>
-            </a:solidFill>
-          </a:ln>
-        </p:spPr>
-        <p:style>
-          <a:lnRef idx="1">
-            <a:schemeClr val="accent1"/>
-          </a:lnRef>
-          <a:fillRef idx="0">
-            <a:schemeClr val="accent1"/>
-          </a:fillRef>
-          <a:effectRef idx="0">
-            <a:schemeClr val="accent1"/>
-          </a:effectRef>
-          <a:fontRef idx="minor">
-            <a:schemeClr val="tx1"/>
-          </a:fontRef>
-        </p:style>
-        <p:txBody>
-          <a:bodyPr rtlCol="0" anchor="ctr"/>
-          <a:lstStyle/>
-          <a:p>
-            <a:pPr algn="ctr"/>
-            <a:endParaRPr lang="en-US"/>
-          </a:p>
-        </p:txBody>
-      </p:sp>
-      <p:cxnSp>
-        <p:nvCxnSpPr>
-          <p:cNvPr id="17" name="Straight Arrow Connector 16">
-            <a:extLst>
-              <a:ext uri="{FF2B5EF4-FFF2-40B4-BE49-F238E27FC236}">
-                <a16:creationId xmlns:a16="http://schemas.microsoft.com/office/drawing/2014/main" id="{60572141-56E1-D65C-762A-8EB6762F1B7E}"/>
-              </a:ext>
-            </a:extLst>
-          </p:cNvPr>
-          <p:cNvCxnSpPr>
-            <a:cxnSpLocks/>
-          </p:cNvCxnSpPr>
-          <p:nvPr/>
-        </p:nvCxnSpPr>
-        <p:spPr>
-          <a:xfrm>
-            <a:off x="10420350" y="844102"/>
-            <a:ext cx="0" cy="4503175"/>
-          </a:xfrm>
-          <a:prstGeom prst="straightConnector1">
-            <a:avLst/>
-          </a:prstGeom>
-          <a:ln w="76200">
-            <a:solidFill>
-              <a:srgbClr val="0070C0"/>
-            </a:solidFill>
-            <a:tailEnd type="triangle"/>
-          </a:ln>
-        </p:spPr>
-        <p:style>
-          <a:lnRef idx="1">
-            <a:schemeClr val="accent1"/>
-          </a:lnRef>
-          <a:fillRef idx="0">
-            <a:schemeClr val="accent1"/>
-          </a:fillRef>
-          <a:effectRef idx="0">
-            <a:schemeClr val="accent1"/>
-          </a:effectRef>
-          <a:fontRef idx="minor">
-            <a:schemeClr val="tx1"/>
-          </a:fontRef>
-        </p:style>
-      </p:cxnSp>
-      <mc:AlternateContent xmlns:mc="http://schemas.openxmlformats.org/markup-compatibility/2006" xmlns:a14="http://schemas.microsoft.com/office/drawing/2010/main">
-        <mc:Choice Requires="a14">
-          <p:sp>
-            <p:nvSpPr>
-              <p:cNvPr id="20" name="TextBox 19">
-                <a:extLst>
-                  <a:ext uri="{FF2B5EF4-FFF2-40B4-BE49-F238E27FC236}">
-                    <a16:creationId xmlns:a16="http://schemas.microsoft.com/office/drawing/2014/main" id="{D9182893-F575-370F-93FD-AABD46DB5B34}"/>
-                  </a:ext>
-                </a:extLst>
-              </p:cNvPr>
-              <p:cNvSpPr txBox="1"/>
-              <p:nvPr/>
-            </p:nvSpPr>
-            <p:spPr>
-              <a:xfrm>
-                <a:off x="7328629" y="2282563"/>
-                <a:ext cx="2072682" cy="307777"/>
-              </a:xfrm>
-              <a:prstGeom prst="rect">
-                <a:avLst/>
-              </a:prstGeom>
-              <a:noFill/>
-            </p:spPr>
-            <p:txBody>
-              <a:bodyPr wrap="none" lIns="0" tIns="0" rIns="0" bIns="0" rtlCol="0">
-                <a:spAutoFit/>
-              </a:bodyPr>
-              <a:lstStyle/>
-              <a:p>
-                <a:pPr/>
-                <a14:m>
-                  <m:oMathPara xmlns:m="http://schemas.openxmlformats.org/officeDocument/2006/math">
-                    <m:oMathParaPr>
-                      <m:jc m:val="centerGroup"/>
-                    </m:oMathParaPr>
-                    <m:oMath xmlns:m="http://schemas.openxmlformats.org/officeDocument/2006/math">
-                      <m:r>
-                        <a:rPr lang="en-US" sz="2000" b="0" i="1" smtClean="0">
-                          <a:latin typeface="Cambria Math" panose="02040503050406030204" pitchFamily="18" charset="0"/>
-                        </a:rPr>
-                        <m:t>340 −167=</m:t>
-                      </m:r>
-                      <m:r>
-                        <a:rPr lang="en-US" sz="2000" b="1" i="1" smtClean="0">
-                          <a:latin typeface="Cambria Math" panose="02040503050406030204" pitchFamily="18" charset="0"/>
-                        </a:rPr>
-                        <m:t>𝟏𝟕𝟑</m:t>
-                      </m:r>
-                    </m:oMath>
-                  </m:oMathPara>
-                </a14:m>
-                <a:endParaRPr lang="en-US" b="1" dirty="0"/>
-              </a:p>
-            </p:txBody>
-          </p:sp>
-        </mc:Choice>
-        <mc:Fallback xmlns="">
-          <p:sp>
-            <p:nvSpPr>
-              <p:cNvPr id="20" name="TextBox 19">
-                <a:extLst>
-                  <a:ext uri="{FF2B5EF4-FFF2-40B4-BE49-F238E27FC236}">
-                    <a16:creationId xmlns:a16="http://schemas.microsoft.com/office/drawing/2014/main" id="{D9182893-F575-370F-93FD-AABD46DB5B34}"/>
-                  </a:ext>
-                </a:extLst>
-              </p:cNvPr>
-              <p:cNvSpPr txBox="1">
-                <a:spLocks noRot="1" noChangeAspect="1" noMove="1" noResize="1" noEditPoints="1" noAdjustHandles="1" noChangeArrowheads="1" noChangeShapeType="1" noTextEdit="1"/>
-              </p:cNvSpPr>
-              <p:nvPr/>
-            </p:nvSpPr>
-            <p:spPr>
-              <a:xfrm>
-                <a:off x="7328629" y="2282563"/>
-                <a:ext cx="2072682" cy="307777"/>
-              </a:xfrm>
-              <a:prstGeom prst="rect">
-                <a:avLst/>
-              </a:prstGeom>
-              <a:blipFill>
-                <a:blip r:embed="rId3"/>
-                <a:stretch>
-                  <a:fillRect l="-2353" r="-2647" b="-5882"/>
-                </a:stretch>
-              </a:blipFill>
-            </p:spPr>
-            <p:txBody>
-              <a:bodyPr/>
-              <a:lstStyle/>
-              <a:p>
-                <a:r>
-                  <a:rPr lang="en-US">
-                    <a:noFill/>
-                  </a:rPr>
-                  <a:t> </a:t>
-                </a:r>
-              </a:p>
-            </p:txBody>
-          </p:sp>
-        </mc:Fallback>
-      </mc:AlternateContent>
-      <p:cxnSp>
-        <p:nvCxnSpPr>
-          <p:cNvPr id="21" name="Straight Arrow Connector 20">
-            <a:extLst>
-              <a:ext uri="{FF2B5EF4-FFF2-40B4-BE49-F238E27FC236}">
-                <a16:creationId xmlns:a16="http://schemas.microsoft.com/office/drawing/2014/main" id="{37A10761-3E76-A720-4A01-BCEED23A554E}"/>
-              </a:ext>
-            </a:extLst>
-          </p:cNvPr>
-          <p:cNvCxnSpPr>
-            <a:cxnSpLocks/>
-          </p:cNvCxnSpPr>
-          <p:nvPr/>
-        </p:nvCxnSpPr>
-        <p:spPr>
-          <a:xfrm>
-            <a:off x="1816678" y="844102"/>
-            <a:ext cx="0" cy="4503175"/>
-          </a:xfrm>
-          <a:prstGeom prst="straightConnector1">
-            <a:avLst/>
-          </a:prstGeom>
-          <a:ln w="76200">
-            <a:solidFill>
-              <a:srgbClr val="00B050"/>
-            </a:solidFill>
-            <a:tailEnd type="triangle"/>
-          </a:ln>
-        </p:spPr>
-        <p:style>
-          <a:lnRef idx="1">
-            <a:schemeClr val="accent1"/>
-          </a:lnRef>
-          <a:fillRef idx="0">
-            <a:schemeClr val="accent1"/>
-          </a:fillRef>
-          <a:effectRef idx="0">
-            <a:schemeClr val="accent1"/>
-          </a:effectRef>
-          <a:fontRef idx="minor">
-            <a:schemeClr val="tx1"/>
-          </a:fontRef>
-        </p:style>
-      </p:cxnSp>
-      <p:sp>
-        <p:nvSpPr>
-          <p:cNvPr id="22" name="TextBox 21">
-            <a:extLst>
-              <a:ext uri="{FF2B5EF4-FFF2-40B4-BE49-F238E27FC236}">
-                <a16:creationId xmlns:a16="http://schemas.microsoft.com/office/drawing/2014/main" id="{7C28DDED-55BC-DD33-5745-B9634F33AA7B}"/>
-              </a:ext>
-            </a:extLst>
-          </p:cNvPr>
-          <p:cNvSpPr txBox="1"/>
-          <p:nvPr/>
-        </p:nvSpPr>
-        <p:spPr>
-          <a:xfrm>
-            <a:off x="378598" y="338349"/>
-            <a:ext cx="3319820" cy="400110"/>
-          </a:xfrm>
-          <a:prstGeom prst="rect">
-            <a:avLst/>
-          </a:prstGeom>
-          <a:noFill/>
-        </p:spPr>
-        <p:txBody>
-          <a:bodyPr wrap="none" rtlCol="0">
-            <a:spAutoFit/>
-          </a:bodyPr>
-          <a:lstStyle/>
-          <a:p>
-            <a:r>
-              <a:rPr lang="en-US" sz="2000" b="1" dirty="0">
-                <a:solidFill>
-                  <a:srgbClr val="00B050"/>
-                </a:solidFill>
-              </a:rPr>
-              <a:t>Frosted Mini Wheats = 0 (mg)</a:t>
-            </a:r>
-          </a:p>
-        </p:txBody>
-      </p:sp>
-      <p:sp>
-        <p:nvSpPr>
-          <p:cNvPr id="23" name="Right Brace 22">
-            <a:extLst>
-              <a:ext uri="{FF2B5EF4-FFF2-40B4-BE49-F238E27FC236}">
-                <a16:creationId xmlns:a16="http://schemas.microsoft.com/office/drawing/2014/main" id="{F14E752A-1AFD-2EE1-5241-D58BCCB24693}"/>
-              </a:ext>
-            </a:extLst>
-          </p:cNvPr>
-          <p:cNvSpPr/>
-          <p:nvPr/>
-        </p:nvSpPr>
-        <p:spPr>
-          <a:xfrm rot="16200000">
-            <a:off x="3787077" y="-99858"/>
-            <a:ext cx="239373" cy="4168922"/>
-          </a:xfrm>
-          <a:prstGeom prst="rightBrace">
-            <a:avLst/>
-          </a:prstGeom>
-          <a:ln w="38100">
-            <a:solidFill>
-              <a:schemeClr val="tx1"/>
-            </a:solidFill>
-          </a:ln>
-        </p:spPr>
-        <p:style>
-          <a:lnRef idx="1">
-            <a:schemeClr val="accent1"/>
-          </a:lnRef>
-          <a:fillRef idx="0">
-            <a:schemeClr val="accent1"/>
-          </a:fillRef>
-          <a:effectRef idx="0">
-            <a:schemeClr val="accent1"/>
-          </a:effectRef>
-          <a:fontRef idx="minor">
-            <a:schemeClr val="tx1"/>
-          </a:fontRef>
-        </p:style>
-        <p:txBody>
-          <a:bodyPr rtlCol="0" anchor="ctr"/>
-          <a:lstStyle/>
-          <a:p>
-            <a:pPr algn="ctr"/>
-            <a:endParaRPr lang="en-US"/>
-          </a:p>
-        </p:txBody>
-      </p:sp>
-      <mc:AlternateContent xmlns:mc="http://schemas.openxmlformats.org/markup-compatibility/2006" xmlns:a14="http://schemas.microsoft.com/office/drawing/2010/main">
-        <mc:Choice Requires="a14">
-          <p:sp>
-            <p:nvSpPr>
-              <p:cNvPr id="24" name="TextBox 23">
-                <a:extLst>
-                  <a:ext uri="{FF2B5EF4-FFF2-40B4-BE49-F238E27FC236}">
-                    <a16:creationId xmlns:a16="http://schemas.microsoft.com/office/drawing/2014/main" id="{A4312EA1-A247-DCFB-9E28-98A481EE5EBD}"/>
-                  </a:ext>
-                </a:extLst>
-              </p:cNvPr>
-              <p:cNvSpPr txBox="1"/>
-              <p:nvPr/>
-            </p:nvSpPr>
-            <p:spPr>
-              <a:xfrm>
-                <a:off x="3084520" y="1485666"/>
-                <a:ext cx="1979709" cy="307777"/>
-              </a:xfrm>
-              <a:prstGeom prst="rect">
-                <a:avLst/>
-              </a:prstGeom>
-              <a:noFill/>
-            </p:spPr>
-            <p:txBody>
-              <a:bodyPr wrap="none" lIns="0" tIns="0" rIns="0" bIns="0" rtlCol="0">
-                <a:spAutoFit/>
-              </a:bodyPr>
-              <a:lstStyle/>
-              <a:p>
-                <a:pPr/>
-                <a14:m>
-                  <m:oMathPara xmlns:m="http://schemas.openxmlformats.org/officeDocument/2006/math">
-                    <m:oMathParaPr>
-                      <m:jc m:val="centerGroup"/>
-                    </m:oMathParaPr>
-                    <m:oMath xmlns:m="http://schemas.openxmlformats.org/officeDocument/2006/math">
-                      <m:r>
-                        <a:rPr lang="en-US" sz="2000" b="0" i="1" smtClean="0">
-                          <a:latin typeface="Cambria Math" panose="02040503050406030204" pitchFamily="18" charset="0"/>
-                        </a:rPr>
-                        <m:t>0 −167=</m:t>
-                      </m:r>
-                      <m:r>
-                        <a:rPr lang="en-US" sz="2000" b="1" i="1" smtClean="0">
-                          <a:latin typeface="Cambria Math" panose="02040503050406030204" pitchFamily="18" charset="0"/>
-                        </a:rPr>
-                        <m:t>−</m:t>
-                      </m:r>
-                      <m:r>
-                        <a:rPr lang="en-US" sz="2000" b="1" i="1" smtClean="0">
-                          <a:latin typeface="Cambria Math" panose="02040503050406030204" pitchFamily="18" charset="0"/>
-                        </a:rPr>
-                        <m:t>𝟏𝟔𝟕</m:t>
-                      </m:r>
-                    </m:oMath>
-                  </m:oMathPara>
-                </a14:m>
-                <a:endParaRPr lang="en-US" b="1" dirty="0"/>
-              </a:p>
-            </p:txBody>
-          </p:sp>
-        </mc:Choice>
-        <mc:Fallback xmlns="">
-          <p:sp>
-            <p:nvSpPr>
-              <p:cNvPr id="24" name="TextBox 23">
-                <a:extLst>
-                  <a:ext uri="{FF2B5EF4-FFF2-40B4-BE49-F238E27FC236}">
-                    <a16:creationId xmlns:a16="http://schemas.microsoft.com/office/drawing/2014/main" id="{A4312EA1-A247-DCFB-9E28-98A481EE5EBD}"/>
-                  </a:ext>
-                </a:extLst>
-              </p:cNvPr>
-              <p:cNvSpPr txBox="1">
-                <a:spLocks noRot="1" noChangeAspect="1" noMove="1" noResize="1" noEditPoints="1" noAdjustHandles="1" noChangeArrowheads="1" noChangeShapeType="1" noTextEdit="1"/>
-              </p:cNvSpPr>
-              <p:nvPr/>
-            </p:nvSpPr>
-            <p:spPr>
-              <a:xfrm>
-                <a:off x="3084520" y="1485666"/>
-                <a:ext cx="1979709" cy="307777"/>
-              </a:xfrm>
-              <a:prstGeom prst="rect">
-                <a:avLst/>
-              </a:prstGeom>
-              <a:blipFill>
-                <a:blip r:embed="rId4"/>
-                <a:stretch>
-                  <a:fillRect l="-2769" r="-2154" b="-6000"/>
-                </a:stretch>
-              </a:blipFill>
-            </p:spPr>
-            <p:txBody>
-              <a:bodyPr/>
-              <a:lstStyle/>
-              <a:p>
-                <a:r>
-                  <a:rPr lang="en-US">
-                    <a:noFill/>
-                  </a:rPr>
-                  <a:t> </a:t>
-                </a:r>
-              </a:p>
-            </p:txBody>
-          </p:sp>
-        </mc:Fallback>
-      </mc:AlternateContent>
-    </p:spTree>
-    <p:extLst>
-      <p:ext uri="{BB962C8B-B14F-4D97-AF65-F5344CB8AC3E}">
-        <p14:creationId xmlns:p14="http://schemas.microsoft.com/office/powerpoint/2010/main" val="2617269405"/>
-      </p:ext>
-    </p:extLst>
-  </p:cSld>
-  <p:clrMapOvr>
-    <a:masterClrMapping/>
-  </p:clrMapOvr>
-</p:sld>
-</file>
-
-<file path=ppt/slides/slide23.xml><?xml version="1.0" encoding="utf-8"?>
-<p:sld xmlns:a="http://schemas.openxmlformats.org/drawingml/2006/main" xmlns:r="http://schemas.openxmlformats.org/officeDocument/2006/relationships" xmlns:p="http://schemas.openxmlformats.org/presentationml/2006/main">
-  <p:cSld>
-    <p:spTree>
-      <p:nvGrpSpPr>
-        <p:cNvPr id="1" name=""/>
-        <p:cNvGrpSpPr/>
-        <p:nvPr/>
-      </p:nvGrpSpPr>
-      <p:grpSpPr>
-        <a:xfrm>
-          <a:off x="0" y="0"/>
-          <a:ext cx="0" cy="0"/>
-          <a:chOff x="0" y="0"/>
-          <a:chExt cx="0" cy="0"/>
-        </a:xfrm>
-      </p:grpSpPr>
-      <p:sp>
-        <p:nvSpPr>
-          <p:cNvPr id="2" name="Title 1">
-            <a:extLst>
-              <a:ext uri="{FF2B5EF4-FFF2-40B4-BE49-F238E27FC236}">
-                <a16:creationId xmlns:a16="http://schemas.microsoft.com/office/drawing/2014/main" id="{F3D51D9B-D3D0-4DD3-432B-B05376CC17A0}"/>
-              </a:ext>
-            </a:extLst>
-          </p:cNvPr>
-          <p:cNvSpPr>
-            <a:spLocks noGrp="1"/>
-          </p:cNvSpPr>
-          <p:nvPr>
-            <p:ph type="title"/>
-          </p:nvPr>
-        </p:nvSpPr>
-        <p:spPr/>
-        <p:txBody>
-          <a:bodyPr/>
-          <a:lstStyle/>
-          <a:p>
-            <a:r>
-              <a:rPr lang="en-US" dirty="0"/>
-              <a:t>Measures of Spread: Variance</a:t>
-            </a:r>
-          </a:p>
-        </p:txBody>
-      </p:sp>
-      <mc:AlternateContent xmlns:mc="http://schemas.openxmlformats.org/markup-compatibility/2006" xmlns:a14="http://schemas.microsoft.com/office/drawing/2010/main">
-        <mc:Choice Requires="a14">
-          <p:sp>
-            <p:nvSpPr>
-              <p:cNvPr id="3" name="Content Placeholder 2">
-                <a:extLst>
-                  <a:ext uri="{FF2B5EF4-FFF2-40B4-BE49-F238E27FC236}">
-                    <a16:creationId xmlns:a16="http://schemas.microsoft.com/office/drawing/2014/main" id="{9824D4B1-FB15-A405-14E1-A713E04E3964}"/>
-                  </a:ext>
-                </a:extLst>
-              </p:cNvPr>
-              <p:cNvSpPr>
-                <a:spLocks noGrp="1"/>
-              </p:cNvSpPr>
-              <p:nvPr>
-                <p:ph idx="1"/>
-              </p:nvPr>
-            </p:nvSpPr>
-            <p:spPr/>
-            <p:txBody>
-              <a:bodyPr>
-                <a:normAutofit fontScale="92500" lnSpcReduction="20000"/>
-              </a:bodyPr>
-              <a:lstStyle/>
-              <a:p>
-                <a:r>
-                  <a:rPr lang="en-US" dirty="0"/>
-                  <a:t>The sum of all deviations is zero.  </a:t>
-                </a:r>
-                <a14:m>
-                  <m:oMath xmlns:m="http://schemas.openxmlformats.org/officeDocument/2006/math">
-                    <m:nary>
-                      <m:naryPr>
-                        <m:chr m:val="∑"/>
-                        <m:ctrlPr>
-                          <a:rPr lang="en-US" i="1" smtClean="0">
-                            <a:latin typeface="Cambria Math" panose="02040503050406030204" pitchFamily="18" charset="0"/>
-                          </a:rPr>
-                        </m:ctrlPr>
-                      </m:naryPr>
-                      <m:sub>
-                        <m:r>
-                          <m:rPr>
-                            <m:brk m:alnAt="23"/>
-                          </m:rPr>
-                          <a:rPr lang="en-US" b="0" i="1" smtClean="0">
-                            <a:latin typeface="Cambria Math" panose="02040503050406030204" pitchFamily="18" charset="0"/>
-                          </a:rPr>
-                          <m:t>𝑖</m:t>
-                        </m:r>
-                        <m:r>
-                          <a:rPr lang="en-US" b="0" i="1" smtClean="0">
-                            <a:latin typeface="Cambria Math" panose="02040503050406030204" pitchFamily="18" charset="0"/>
-                          </a:rPr>
-                          <m:t>=1</m:t>
-                        </m:r>
-                      </m:sub>
-                      <m:sup>
-                        <m:r>
-                          <a:rPr lang="en-US" b="0" i="1" smtClean="0">
-                            <a:latin typeface="Cambria Math" panose="02040503050406030204" pitchFamily="18" charset="0"/>
-                          </a:rPr>
-                          <m:t>𝑛</m:t>
-                        </m:r>
-                      </m:sup>
-                      <m:e>
-                        <m:r>
-                          <a:rPr lang="en-US" b="0" i="1" smtClean="0">
-                            <a:latin typeface="Cambria Math" panose="02040503050406030204" pitchFamily="18" charset="0"/>
-                          </a:rPr>
-                          <m:t>(</m:t>
-                        </m:r>
-                        <m:sSub>
-                          <m:sSubPr>
-                            <m:ctrlPr>
-                              <a:rPr lang="en-US" b="0" i="1" smtClean="0">
-                                <a:latin typeface="Cambria Math" panose="02040503050406030204" pitchFamily="18" charset="0"/>
-                              </a:rPr>
-                            </m:ctrlPr>
-                          </m:sSubPr>
-                          <m:e>
-                            <m:r>
-                              <a:rPr lang="en-US" b="0" i="1" smtClean="0">
-                                <a:latin typeface="Cambria Math" panose="02040503050406030204" pitchFamily="18" charset="0"/>
-                              </a:rPr>
-                              <m:t>𝑥</m:t>
-                            </m:r>
-                          </m:e>
-                          <m:sub>
-                            <m:r>
-                              <a:rPr lang="en-US" b="0" i="1" smtClean="0">
-                                <a:latin typeface="Cambria Math" panose="02040503050406030204" pitchFamily="18" charset="0"/>
-                              </a:rPr>
-                              <m:t>𝑖</m:t>
-                            </m:r>
-                          </m:sub>
-                        </m:sSub>
-                        <m:r>
-                          <a:rPr lang="en-US" b="0" i="1" smtClean="0">
-                            <a:latin typeface="Cambria Math" panose="02040503050406030204" pitchFamily="18" charset="0"/>
-                          </a:rPr>
-                          <m:t> − </m:t>
-                        </m:r>
-                        <m:acc>
-                          <m:accPr>
-                            <m:chr m:val="̅"/>
-                            <m:ctrlPr>
-                              <a:rPr lang="en-US" b="0" i="1" smtClean="0">
-                                <a:latin typeface="Cambria Math" panose="02040503050406030204" pitchFamily="18" charset="0"/>
-                              </a:rPr>
-                            </m:ctrlPr>
-                          </m:accPr>
-                          <m:e>
-                            <m:r>
-                              <a:rPr lang="en-US" b="0" i="1" smtClean="0">
-                                <a:latin typeface="Cambria Math" panose="02040503050406030204" pitchFamily="18" charset="0"/>
-                              </a:rPr>
-                              <m:t>𝑥</m:t>
-                            </m:r>
-                          </m:e>
-                        </m:acc>
-                        <m:r>
-                          <a:rPr lang="en-US" b="0" i="1" smtClean="0">
-                            <a:latin typeface="Cambria Math" panose="02040503050406030204" pitchFamily="18" charset="0"/>
-                          </a:rPr>
-                          <m:t>)</m:t>
-                        </m:r>
-                      </m:e>
-                    </m:nary>
-                    <m:r>
-                      <a:rPr lang="en-US" b="0" i="1" smtClean="0">
-                        <a:latin typeface="Cambria Math" panose="02040503050406030204" pitchFamily="18" charset="0"/>
-                      </a:rPr>
-                      <m:t>=</m:t>
-                    </m:r>
-                    <m:r>
-                      <a:rPr lang="en-US" b="0" i="1" smtClean="0">
-                        <a:latin typeface="Cambria Math" panose="02040503050406030204" pitchFamily="18" charset="0"/>
-                        <a:ea typeface="Cambria Math" panose="02040503050406030204" pitchFamily="18" charset="0"/>
-                      </a:rPr>
-                      <m:t>0</m:t>
-                    </m:r>
-                  </m:oMath>
-                </a14:m>
-                <a:endParaRPr lang="en-US" dirty="0"/>
-              </a:p>
-              <a:p>
-                <a:endParaRPr lang="en-US" dirty="0"/>
-              </a:p>
-              <a:p>
-                <a:r>
-                  <a:rPr lang="en-US" dirty="0"/>
-                  <a:t>We typically use either the </a:t>
-                </a:r>
-                <a:r>
-                  <a:rPr lang="en-US" b="1" dirty="0"/>
-                  <a:t>squared deviations</a:t>
-                </a:r>
-                <a:r>
-                  <a:rPr lang="en-US" dirty="0"/>
-                  <a:t> or their </a:t>
-                </a:r>
-                <a:r>
-                  <a:rPr lang="en-US" b="1" dirty="0"/>
-                  <a:t>absolute value</a:t>
-                </a:r>
-              </a:p>
-              <a:p>
-                <a:pPr marL="914400" lvl="2" indent="0">
-                  <a:buNone/>
-                </a:pPr>
-                <a:r>
-                  <a:rPr lang="en-US" sz="2400" dirty="0"/>
-                  <a:t>Squared deviation of an observation </a:t>
-                </a:r>
-                <a14:m>
-                  <m:oMath xmlns:m="http://schemas.openxmlformats.org/officeDocument/2006/math">
-                    <m:sSub>
-                      <m:sSubPr>
-                        <m:ctrlPr>
-                          <a:rPr lang="en-US" sz="2400" i="1" smtClean="0">
-                            <a:latin typeface="Cambria Math" panose="02040503050406030204" pitchFamily="18" charset="0"/>
-                          </a:rPr>
-                        </m:ctrlPr>
-                      </m:sSubPr>
-                      <m:e>
-                        <m:r>
-                          <a:rPr lang="en-US" sz="2400" b="0" i="1" smtClean="0">
-                            <a:latin typeface="Cambria Math" panose="02040503050406030204" pitchFamily="18" charset="0"/>
-                          </a:rPr>
-                          <m:t>𝑥</m:t>
-                        </m:r>
-                      </m:e>
-                      <m:sub>
-                        <m:r>
-                          <a:rPr lang="en-US" sz="2400" b="0" i="1" smtClean="0">
-                            <a:latin typeface="Cambria Math" panose="02040503050406030204" pitchFamily="18" charset="0"/>
-                          </a:rPr>
-                          <m:t>𝑖</m:t>
-                        </m:r>
-                      </m:sub>
-                    </m:sSub>
-                    <m:r>
-                      <a:rPr lang="en-US" sz="2400" b="0" i="1" smtClean="0">
-                        <a:latin typeface="Cambria Math" panose="02040503050406030204" pitchFamily="18" charset="0"/>
-                      </a:rPr>
-                      <m:t>= </m:t>
-                    </m:r>
-                    <m:sSup>
-                      <m:sSupPr>
-                        <m:ctrlPr>
-                          <a:rPr lang="en-US" sz="2400" i="1" smtClean="0">
-                            <a:latin typeface="Cambria Math" panose="02040503050406030204" pitchFamily="18" charset="0"/>
-                          </a:rPr>
-                        </m:ctrlPr>
-                      </m:sSupPr>
-                      <m:e>
-                        <m:d>
-                          <m:dPr>
-                            <m:ctrlPr>
-                              <a:rPr lang="en-US" sz="2400" i="1" smtClean="0">
-                                <a:latin typeface="Cambria Math" panose="02040503050406030204" pitchFamily="18" charset="0"/>
-                              </a:rPr>
-                            </m:ctrlPr>
-                          </m:dPr>
-                          <m:e>
-                            <m:sSub>
-                              <m:sSubPr>
-                                <m:ctrlPr>
-                                  <a:rPr lang="en-US" sz="2400" i="1" smtClean="0">
-                                    <a:latin typeface="Cambria Math" panose="02040503050406030204" pitchFamily="18" charset="0"/>
-                                  </a:rPr>
-                                </m:ctrlPr>
-                              </m:sSubPr>
-                              <m:e>
-                                <m:r>
-                                  <a:rPr lang="en-US" sz="2400" b="0" i="1" smtClean="0">
-                                    <a:latin typeface="Cambria Math" panose="02040503050406030204" pitchFamily="18" charset="0"/>
-                                  </a:rPr>
-                                  <m:t>𝑥</m:t>
-                                </m:r>
-                              </m:e>
-                              <m:sub>
-                                <m:r>
-                                  <a:rPr lang="en-US" sz="2400" b="0" i="1" smtClean="0">
-                                    <a:latin typeface="Cambria Math" panose="02040503050406030204" pitchFamily="18" charset="0"/>
-                                  </a:rPr>
-                                  <m:t>𝑖</m:t>
-                                </m:r>
-                              </m:sub>
-                            </m:sSub>
-                            <m:r>
-                              <a:rPr lang="en-US" sz="2400" b="0" i="1" smtClean="0">
-                                <a:latin typeface="Cambria Math" panose="02040503050406030204" pitchFamily="18" charset="0"/>
-                              </a:rPr>
-                              <m:t>− </m:t>
-                            </m:r>
-                            <m:acc>
-                              <m:accPr>
-                                <m:chr m:val="̅"/>
-                                <m:ctrlPr>
-                                  <a:rPr lang="en-US" sz="2400" b="0" i="1" smtClean="0">
-                                    <a:latin typeface="Cambria Math" panose="02040503050406030204" pitchFamily="18" charset="0"/>
-                                  </a:rPr>
-                                </m:ctrlPr>
-                              </m:accPr>
-                              <m:e>
-                                <m:r>
-                                  <a:rPr lang="en-US" sz="2400" b="0" i="1" smtClean="0">
-                                    <a:latin typeface="Cambria Math" panose="02040503050406030204" pitchFamily="18" charset="0"/>
-                                  </a:rPr>
-                                  <m:t>𝑥</m:t>
-                                </m:r>
-                              </m:e>
-                            </m:acc>
-                          </m:e>
-                        </m:d>
-                      </m:e>
-                      <m:sup>
-                        <m:r>
-                          <a:rPr lang="en-US" sz="2400" b="0" i="1" smtClean="0">
-                            <a:latin typeface="Cambria Math" panose="02040503050406030204" pitchFamily="18" charset="0"/>
-                          </a:rPr>
-                          <m:t>2</m:t>
-                        </m:r>
-                      </m:sup>
-                    </m:sSup>
-                  </m:oMath>
-                </a14:m>
-                <a:endParaRPr lang="en-US" dirty="0"/>
-              </a:p>
-              <a:p>
-                <a:pPr marL="914400" lvl="2" indent="0">
-                  <a:buNone/>
-                </a:pPr>
-                <a:endParaRPr lang="en-US" dirty="0"/>
-              </a:p>
-              <a:p>
-                <a:r>
-                  <a:rPr lang="en-US" dirty="0"/>
-                  <a:t>The </a:t>
-                </a:r>
-                <a:r>
-                  <a:rPr lang="en-US" b="1" dirty="0"/>
-                  <a:t>Variance </a:t>
-                </a:r>
-                <a:r>
-                  <a:rPr lang="en-US" dirty="0"/>
-                  <a:t>of a distribution is the </a:t>
-                </a:r>
-                <a:r>
-                  <a:rPr lang="en-US" u="sng" dirty="0"/>
-                  <a:t>average</a:t>
-                </a:r>
-                <a:r>
-                  <a:rPr lang="en-US" dirty="0"/>
-                  <a:t> squared deviation from the mean</a:t>
-                </a:r>
-              </a:p>
-              <a:p>
-                <a:pPr marL="1828800" lvl="4" indent="0">
-                  <a:buNone/>
-                </a:pPr>
-                <a14:m>
-                  <m:oMathPara xmlns:m="http://schemas.openxmlformats.org/officeDocument/2006/math">
-                    <m:oMathParaPr>
-                      <m:jc m:val="centerGroup"/>
-                    </m:oMathParaPr>
-                    <m:oMath xmlns:m="http://schemas.openxmlformats.org/officeDocument/2006/math">
-                      <m:sSup>
-                        <m:sSupPr>
-                          <m:ctrlPr>
-                            <a:rPr lang="en-US" sz="2400" i="1" smtClean="0">
-                              <a:solidFill>
-                                <a:srgbClr val="836967"/>
-                              </a:solidFill>
-                              <a:latin typeface="Cambria Math" panose="02040503050406030204" pitchFamily="18" charset="0"/>
-                            </a:rPr>
-                          </m:ctrlPr>
-                        </m:sSupPr>
-                        <m:e>
-                          <m:r>
-                            <a:rPr lang="en-US" sz="2400" i="1" smtClean="0">
-                              <a:latin typeface="Cambria Math" panose="02040503050406030204" pitchFamily="18" charset="0"/>
-                            </a:rPr>
-                            <m:t>𝑆</m:t>
-                          </m:r>
-                        </m:e>
-                        <m:sup>
-                          <m:r>
-                            <a:rPr lang="en-US" sz="2400" i="1" smtClean="0">
-                              <a:latin typeface="Cambria Math" panose="02040503050406030204" pitchFamily="18" charset="0"/>
-                            </a:rPr>
-                            <m:t>2</m:t>
-                          </m:r>
-                        </m:sup>
-                      </m:sSup>
-                      <m:r>
-                        <a:rPr lang="en-US" sz="2400" i="1" smtClean="0">
-                          <a:latin typeface="Cambria Math" panose="02040503050406030204" pitchFamily="18" charset="0"/>
-                        </a:rPr>
-                        <m:t>=</m:t>
-                      </m:r>
-                      <m:f>
-                        <m:fPr>
-                          <m:ctrlPr>
-                            <a:rPr lang="en-US" sz="2400" i="1" smtClean="0">
-                              <a:solidFill>
-                                <a:srgbClr val="836967"/>
-                              </a:solidFill>
-                              <a:latin typeface="Cambria Math" panose="02040503050406030204" pitchFamily="18" charset="0"/>
-                            </a:rPr>
-                          </m:ctrlPr>
-                        </m:fPr>
-                        <m:num>
-                          <m:r>
-                            <a:rPr lang="en-US" sz="2400" i="1" smtClean="0">
-                              <a:latin typeface="Cambria Math" panose="02040503050406030204" pitchFamily="18" charset="0"/>
-                            </a:rPr>
-                            <m:t>1</m:t>
-                          </m:r>
-                        </m:num>
-                        <m:den>
-                          <m:r>
-                            <a:rPr lang="en-US" sz="2400" i="1" smtClean="0">
-                              <a:latin typeface="Cambria Math" panose="02040503050406030204" pitchFamily="18" charset="0"/>
-                            </a:rPr>
-                            <m:t>𝑛</m:t>
-                          </m:r>
-                          <m:r>
-                            <a:rPr lang="en-US" sz="2400" i="1" smtClean="0">
-                              <a:latin typeface="Cambria Math" panose="02040503050406030204" pitchFamily="18" charset="0"/>
-                            </a:rPr>
-                            <m:t>−1</m:t>
-                          </m:r>
-                        </m:den>
-                      </m:f>
-                      <m:nary>
-                        <m:naryPr>
-                          <m:chr m:val="∑"/>
-                          <m:limLoc m:val="undOvr"/>
-                          <m:grow m:val="on"/>
-                          <m:ctrlPr>
-                            <a:rPr lang="en-US" sz="2400" i="1" smtClean="0">
-                              <a:latin typeface="Cambria Math" panose="02040503050406030204" pitchFamily="18" charset="0"/>
-                            </a:rPr>
-                          </m:ctrlPr>
-                        </m:naryPr>
-                        <m:sub>
-                          <m:r>
-                            <a:rPr lang="en-US" sz="2400" i="1" smtClean="0">
-                              <a:latin typeface="Cambria Math" panose="02040503050406030204" pitchFamily="18" charset="0"/>
-                            </a:rPr>
-                            <m:t>𝑖</m:t>
-                          </m:r>
-                          <m:r>
-                            <a:rPr lang="en-US" sz="2400" i="1" smtClean="0">
-                              <a:latin typeface="Cambria Math" panose="02040503050406030204" pitchFamily="18" charset="0"/>
-                            </a:rPr>
-                            <m:t>=1</m:t>
-                          </m:r>
-                        </m:sub>
-                        <m:sup>
-                          <m:r>
-                            <a:rPr lang="en-US" sz="2400" i="1" smtClean="0">
-                              <a:latin typeface="Cambria Math" panose="02040503050406030204" pitchFamily="18" charset="0"/>
-                            </a:rPr>
-                            <m:t>𝑛</m:t>
-                          </m:r>
-                        </m:sup>
-                        <m:e>
-                          <m:sSup>
-                            <m:sSupPr>
-                              <m:ctrlPr>
-                                <a:rPr lang="en-US" sz="2400" i="1" smtClean="0">
-                                  <a:solidFill>
-                                    <a:srgbClr val="836967"/>
-                                  </a:solidFill>
-                                  <a:latin typeface="Cambria Math" panose="02040503050406030204" pitchFamily="18" charset="0"/>
-                                </a:rPr>
-                              </m:ctrlPr>
-                            </m:sSupPr>
-                            <m:e>
-                              <m:d>
-                                <m:dPr>
-                                  <m:ctrlPr>
-                                    <a:rPr lang="en-US" sz="2400" i="1" smtClean="0">
-                                      <a:solidFill>
-                                        <a:srgbClr val="836967"/>
-                                      </a:solidFill>
-                                      <a:latin typeface="Cambria Math" panose="02040503050406030204" pitchFamily="18" charset="0"/>
-                                    </a:rPr>
-                                  </m:ctrlPr>
-                                </m:dPr>
-                                <m:e>
-                                  <m:sSub>
-                                    <m:sSubPr>
-                                      <m:ctrlPr>
-                                        <a:rPr lang="en-US" sz="2400" i="1" smtClean="0">
-                                          <a:solidFill>
-                                            <a:srgbClr val="836967"/>
-                                          </a:solidFill>
-                                          <a:latin typeface="Cambria Math" panose="02040503050406030204" pitchFamily="18" charset="0"/>
-                                        </a:rPr>
-                                      </m:ctrlPr>
-                                    </m:sSubPr>
-                                    <m:e>
-                                      <m:r>
-                                        <a:rPr lang="en-US" sz="2400" i="1" smtClean="0">
-                                          <a:latin typeface="Cambria Math" panose="02040503050406030204" pitchFamily="18" charset="0"/>
-                                        </a:rPr>
-                                        <m:t>𝑥</m:t>
-                                      </m:r>
-                                    </m:e>
-                                    <m:sub>
-                                      <m:r>
-                                        <a:rPr lang="en-US" sz="2400" i="1" smtClean="0">
-                                          <a:latin typeface="Cambria Math" panose="02040503050406030204" pitchFamily="18" charset="0"/>
-                                        </a:rPr>
-                                        <m:t>𝑖</m:t>
-                                      </m:r>
-                                    </m:sub>
-                                  </m:sSub>
-                                  <m:r>
-                                    <a:rPr lang="en-US" sz="2400" i="1" smtClean="0">
-                                      <a:latin typeface="Cambria Math" panose="02040503050406030204" pitchFamily="18" charset="0"/>
-                                    </a:rPr>
-                                    <m:t>−</m:t>
-                                  </m:r>
-                                  <m:acc>
-                                    <m:accPr>
-                                      <m:chr m:val="̅"/>
-                                      <m:ctrlPr>
-                                        <a:rPr lang="en-US" sz="2400" i="1" smtClean="0">
-                                          <a:solidFill>
-                                            <a:srgbClr val="836967"/>
-                                          </a:solidFill>
-                                          <a:latin typeface="Cambria Math" panose="02040503050406030204" pitchFamily="18" charset="0"/>
-                                        </a:rPr>
-                                      </m:ctrlPr>
-                                    </m:accPr>
-                                    <m:e>
-                                      <m:r>
-                                        <a:rPr lang="en-US" sz="2400" i="1" smtClean="0">
-                                          <a:latin typeface="Cambria Math" panose="02040503050406030204" pitchFamily="18" charset="0"/>
-                                        </a:rPr>
-                                        <m:t>𝑥</m:t>
-                                      </m:r>
-                                    </m:e>
-                                  </m:acc>
-                                </m:e>
-                              </m:d>
-                            </m:e>
-                            <m:sup>
-                              <m:r>
-                                <a:rPr lang="en-US" sz="2400" i="1" smtClean="0">
-                                  <a:latin typeface="Cambria Math" panose="02040503050406030204" pitchFamily="18" charset="0"/>
-                                </a:rPr>
-                                <m:t>2</m:t>
-                              </m:r>
-                            </m:sup>
-                          </m:sSup>
-                        </m:e>
-                      </m:nary>
-                    </m:oMath>
-                  </m:oMathPara>
-                </a14:m>
-                <a:endParaRPr lang="en-US" sz="2400" i="1" dirty="0">
-                  <a:latin typeface="Cambria Math" panose="02040503050406030204" pitchFamily="18" charset="0"/>
-                </a:endParaRPr>
-              </a:p>
-              <a:p>
-                <a:pPr marL="0" indent="0">
-                  <a:buNone/>
-                </a:pPr>
-                <a:endParaRPr lang="en-US" sz="2600" dirty="0"/>
-              </a:p>
-              <a:p>
-                <a:r>
-                  <a:rPr lang="en-US" sz="2600" dirty="0"/>
-                  <a:t>The sum </a:t>
-                </a:r>
-                <a14:m>
-                  <m:oMath xmlns:m="http://schemas.openxmlformats.org/officeDocument/2006/math">
-                    <m:nary>
-                      <m:naryPr>
-                        <m:chr m:val="∑"/>
-                        <m:limLoc m:val="undOvr"/>
-                        <m:grow m:val="on"/>
-                        <m:ctrlPr>
-                          <a:rPr lang="en-US" sz="2600" i="1" smtClean="0">
-                            <a:latin typeface="Cambria Math" panose="02040503050406030204" pitchFamily="18" charset="0"/>
-                          </a:rPr>
-                        </m:ctrlPr>
-                      </m:naryPr>
-                      <m:sub>
-                        <m:r>
-                          <a:rPr lang="en-US" sz="2600" i="1" smtClean="0">
-                            <a:latin typeface="Cambria Math" panose="02040503050406030204" pitchFamily="18" charset="0"/>
-                          </a:rPr>
-                          <m:t>𝑖</m:t>
-                        </m:r>
-                        <m:r>
-                          <a:rPr lang="en-US" sz="2600" i="1" smtClean="0">
-                            <a:latin typeface="Cambria Math" panose="02040503050406030204" pitchFamily="18" charset="0"/>
-                          </a:rPr>
-                          <m:t>=1</m:t>
-                        </m:r>
-                      </m:sub>
-                      <m:sup>
-                        <m:r>
-                          <a:rPr lang="en-US" sz="2600" i="1" smtClean="0">
-                            <a:latin typeface="Cambria Math" panose="02040503050406030204" pitchFamily="18" charset="0"/>
-                          </a:rPr>
-                          <m:t>𝑛</m:t>
-                        </m:r>
-                      </m:sup>
-                      <m:e>
-                        <m:sSup>
-                          <m:sSupPr>
-                            <m:ctrlPr>
-                              <a:rPr lang="en-US" sz="2600" i="1" smtClean="0">
-                                <a:solidFill>
-                                  <a:srgbClr val="836967"/>
-                                </a:solidFill>
-                                <a:latin typeface="Cambria Math" panose="02040503050406030204" pitchFamily="18" charset="0"/>
-                              </a:rPr>
-                            </m:ctrlPr>
-                          </m:sSupPr>
-                          <m:e>
-                            <m:d>
-                              <m:dPr>
-                                <m:ctrlPr>
-                                  <a:rPr lang="en-US" sz="2600" i="1" smtClean="0">
-                                    <a:solidFill>
-                                      <a:srgbClr val="836967"/>
-                                    </a:solidFill>
-                                    <a:latin typeface="Cambria Math" panose="02040503050406030204" pitchFamily="18" charset="0"/>
-                                  </a:rPr>
-                                </m:ctrlPr>
-                              </m:dPr>
-                              <m:e>
-                                <m:sSub>
-                                  <m:sSubPr>
-                                    <m:ctrlPr>
-                                      <a:rPr lang="en-US" sz="2600" i="1" smtClean="0">
-                                        <a:solidFill>
-                                          <a:srgbClr val="836967"/>
-                                        </a:solidFill>
-                                        <a:latin typeface="Cambria Math" panose="02040503050406030204" pitchFamily="18" charset="0"/>
-                                      </a:rPr>
-                                    </m:ctrlPr>
-                                  </m:sSubPr>
-                                  <m:e>
-                                    <m:r>
-                                      <a:rPr lang="en-US" sz="2600" i="1" smtClean="0">
-                                        <a:latin typeface="Cambria Math" panose="02040503050406030204" pitchFamily="18" charset="0"/>
-                                      </a:rPr>
-                                      <m:t>𝑥</m:t>
-                                    </m:r>
-                                  </m:e>
-                                  <m:sub>
-                                    <m:r>
-                                      <a:rPr lang="en-US" sz="2600" i="1" smtClean="0">
-                                        <a:latin typeface="Cambria Math" panose="02040503050406030204" pitchFamily="18" charset="0"/>
-                                      </a:rPr>
-                                      <m:t>𝑖</m:t>
-                                    </m:r>
-                                  </m:sub>
-                                </m:sSub>
-                                <m:r>
-                                  <a:rPr lang="en-US" sz="2600" i="1" smtClean="0">
-                                    <a:latin typeface="Cambria Math" panose="02040503050406030204" pitchFamily="18" charset="0"/>
-                                  </a:rPr>
-                                  <m:t>−</m:t>
-                                </m:r>
-                                <m:acc>
-                                  <m:accPr>
-                                    <m:chr m:val="̅"/>
-                                    <m:ctrlPr>
-                                      <a:rPr lang="en-US" sz="2600" i="1" smtClean="0">
-                                        <a:solidFill>
-                                          <a:srgbClr val="836967"/>
-                                        </a:solidFill>
-                                        <a:latin typeface="Cambria Math" panose="02040503050406030204" pitchFamily="18" charset="0"/>
-                                      </a:rPr>
-                                    </m:ctrlPr>
-                                  </m:accPr>
-                                  <m:e>
-                                    <m:r>
-                                      <a:rPr lang="en-US" sz="2600" i="1" smtClean="0">
-                                        <a:latin typeface="Cambria Math" panose="02040503050406030204" pitchFamily="18" charset="0"/>
-                                      </a:rPr>
-                                      <m:t>𝑥</m:t>
-                                    </m:r>
-                                  </m:e>
-                                </m:acc>
-                              </m:e>
-                            </m:d>
-                          </m:e>
-                          <m:sup>
-                            <m:r>
-                              <a:rPr lang="en-US" sz="2600" i="1" smtClean="0">
-                                <a:latin typeface="Cambria Math" panose="02040503050406030204" pitchFamily="18" charset="0"/>
-                              </a:rPr>
-                              <m:t>2</m:t>
-                            </m:r>
-                          </m:sup>
-                        </m:sSup>
-                      </m:e>
-                    </m:nary>
-                  </m:oMath>
-                </a14:m>
-                <a:r>
-                  <a:rPr lang="en-US" sz="2600" dirty="0"/>
-                  <a:t> is called the sum of squares</a:t>
-                </a:r>
-              </a:p>
-            </p:txBody>
-          </p:sp>
-        </mc:Choice>
-        <mc:Fallback xmlns="">
-          <p:sp>
-            <p:nvSpPr>
-              <p:cNvPr id="3" name="Content Placeholder 2">
-                <a:extLst>
-                  <a:ext uri="{FF2B5EF4-FFF2-40B4-BE49-F238E27FC236}">
-                    <a16:creationId xmlns:a16="http://schemas.microsoft.com/office/drawing/2014/main" id="{9824D4B1-FB15-A405-14E1-A713E04E3964}"/>
-                  </a:ext>
-                </a:extLst>
-              </p:cNvPr>
-              <p:cNvSpPr>
-                <a:spLocks noGrp="1" noRot="1" noChangeAspect="1" noMove="1" noResize="1" noEditPoints="1" noAdjustHandles="1" noChangeArrowheads="1" noChangeShapeType="1" noTextEdit="1"/>
-              </p:cNvSpPr>
-              <p:nvPr>
-                <p:ph idx="1"/>
-              </p:nvPr>
-            </p:nvSpPr>
-            <p:spPr>
-              <a:blipFill>
-                <a:blip r:embed="rId2"/>
-                <a:stretch>
-                  <a:fillRect l="-928" t="-3501"/>
-                </a:stretch>
-              </a:blipFill>
-            </p:spPr>
-            <p:txBody>
-              <a:bodyPr/>
-              <a:lstStyle/>
-              <a:p>
-                <a:r>
-                  <a:rPr lang="en-US">
-                    <a:noFill/>
-                  </a:rPr>
-                  <a:t> </a:t>
-                </a:r>
-              </a:p>
-            </p:txBody>
-          </p:sp>
-        </mc:Fallback>
-      </mc:AlternateContent>
-    </p:spTree>
-    <p:extLst>
-      <p:ext uri="{BB962C8B-B14F-4D97-AF65-F5344CB8AC3E}">
-        <p14:creationId xmlns:p14="http://schemas.microsoft.com/office/powerpoint/2010/main" val="1266910087"/>
-      </p:ext>
-    </p:extLst>
-  </p:cSld>
-  <p:clrMapOvr>
-    <a:masterClrMapping/>
-  </p:clrMapOvr>
-</p:sld>
-</file>
-
-<file path=ppt/slides/slide24.xml><?xml version="1.0" encoding="utf-8"?>
-<p:sld xmlns:a="http://schemas.openxmlformats.org/drawingml/2006/main" xmlns:r="http://schemas.openxmlformats.org/officeDocument/2006/relationships" xmlns:p="http://schemas.openxmlformats.org/presentationml/2006/main">
-  <p:cSld>
-    <p:spTree>
-      <p:nvGrpSpPr>
-        <p:cNvPr id="1" name=""/>
-        <p:cNvGrpSpPr/>
-        <p:nvPr/>
-      </p:nvGrpSpPr>
-      <p:grpSpPr>
-        <a:xfrm>
-          <a:off x="0" y="0"/>
-          <a:ext cx="0" cy="0"/>
-          <a:chOff x="0" y="0"/>
-          <a:chExt cx="0" cy="0"/>
-        </a:xfrm>
-      </p:grpSpPr>
-      <p:sp>
-        <p:nvSpPr>
-          <p:cNvPr id="2" name="Title 1">
-            <a:extLst>
-              <a:ext uri="{FF2B5EF4-FFF2-40B4-BE49-F238E27FC236}">
-                <a16:creationId xmlns:a16="http://schemas.microsoft.com/office/drawing/2014/main" id="{03759E61-7A67-5D11-4320-1B5FFC9226BE}"/>
-              </a:ext>
-            </a:extLst>
-          </p:cNvPr>
-          <p:cNvSpPr>
-            <a:spLocks noGrp="1"/>
-          </p:cNvSpPr>
-          <p:nvPr>
-            <p:ph type="title"/>
-          </p:nvPr>
-        </p:nvSpPr>
-        <p:spPr>
-          <a:xfrm>
-            <a:off x="838200" y="0"/>
-            <a:ext cx="10515600" cy="1325563"/>
-          </a:xfrm>
-        </p:spPr>
-        <p:txBody>
-          <a:bodyPr/>
-          <a:lstStyle/>
-          <a:p>
-            <a:r>
-              <a:rPr lang="en-US" dirty="0"/>
-              <a:t>Measures of Spread: Standard Deviation</a:t>
-            </a:r>
-          </a:p>
-        </p:txBody>
-      </p:sp>
-      <mc:AlternateContent xmlns:mc="http://schemas.openxmlformats.org/markup-compatibility/2006" xmlns:a14="http://schemas.microsoft.com/office/drawing/2010/main">
-        <mc:Choice Requires="a14">
-          <p:sp>
-            <p:nvSpPr>
-              <p:cNvPr id="3" name="Content Placeholder 2">
-                <a:extLst>
-                  <a:ext uri="{FF2B5EF4-FFF2-40B4-BE49-F238E27FC236}">
-                    <a16:creationId xmlns:a16="http://schemas.microsoft.com/office/drawing/2014/main" id="{F801D609-D493-78C3-4B57-D24A155F0AAF}"/>
-                  </a:ext>
-                </a:extLst>
-              </p:cNvPr>
-              <p:cNvSpPr>
-                <a:spLocks noGrp="1"/>
-              </p:cNvSpPr>
-              <p:nvPr>
-                <p:ph idx="1"/>
-              </p:nvPr>
-            </p:nvSpPr>
-            <p:spPr>
-              <a:xfrm>
-                <a:off x="838200" y="1548533"/>
-                <a:ext cx="10515600" cy="4935393"/>
-              </a:xfrm>
-            </p:spPr>
-            <p:txBody>
-              <a:bodyPr>
-                <a:normAutofit fontScale="85000" lnSpcReduction="20000"/>
-              </a:bodyPr>
-              <a:lstStyle/>
-              <a:p>
-                <a:r>
-                  <a:rPr lang="en-US" dirty="0"/>
-                  <a:t>Since the variance uses the squared deviation, we usually take its square root called the </a:t>
-                </a:r>
-                <a:r>
-                  <a:rPr lang="en-US" b="1" dirty="0"/>
-                  <a:t>standard deviation</a:t>
-                </a:r>
-              </a:p>
-              <a:p>
-                <a:endParaRPr lang="en-US" b="1" dirty="0"/>
-              </a:p>
-              <a:p>
-                <a:pPr marL="914400" lvl="2" indent="0">
-                  <a:buNone/>
-                </a:pPr>
-                <a14:m>
-                  <m:oMathPara xmlns:m="http://schemas.openxmlformats.org/officeDocument/2006/math">
-                    <m:oMathParaPr>
-                      <m:jc m:val="centerGroup"/>
-                    </m:oMathParaPr>
-                    <m:oMath xmlns:m="http://schemas.openxmlformats.org/officeDocument/2006/math">
-                      <m:r>
-                        <a:rPr lang="en-US" sz="2400" b="0" i="1" smtClean="0">
-                          <a:latin typeface="Cambria Math" panose="02040503050406030204" pitchFamily="18" charset="0"/>
-                        </a:rPr>
-                        <m:t>𝑠</m:t>
-                      </m:r>
-                      <m:r>
-                        <a:rPr lang="en-US" sz="2400" b="0" i="1" smtClean="0">
-                          <a:latin typeface="Cambria Math" panose="02040503050406030204" pitchFamily="18" charset="0"/>
-                        </a:rPr>
-                        <m:t>=</m:t>
-                      </m:r>
-                      <m:rad>
-                        <m:radPr>
-                          <m:degHide m:val="on"/>
-                          <m:ctrlPr>
-                            <a:rPr lang="en-US" sz="2400" b="0" i="1" smtClean="0">
-                              <a:latin typeface="Cambria Math" panose="02040503050406030204" pitchFamily="18" charset="0"/>
-                            </a:rPr>
-                          </m:ctrlPr>
-                        </m:radPr>
-                        <m:deg/>
-                        <m:e>
-                          <m:f>
-                            <m:fPr>
-                              <m:ctrlPr>
-                                <a:rPr lang="en-US" sz="2400" b="0" i="1" smtClean="0">
-                                  <a:latin typeface="Cambria Math" panose="02040503050406030204" pitchFamily="18" charset="0"/>
-                                </a:rPr>
-                              </m:ctrlPr>
-                            </m:fPr>
-                            <m:num>
-                              <m:r>
-                                <a:rPr lang="en-US" sz="2400" b="0" i="1" smtClean="0">
-                                  <a:latin typeface="Cambria Math" panose="02040503050406030204" pitchFamily="18" charset="0"/>
-                                </a:rPr>
-                                <m:t>1</m:t>
-                              </m:r>
-                            </m:num>
-                            <m:den>
-                              <m:r>
-                                <a:rPr lang="en-US" sz="2400" b="0" i="1" smtClean="0">
-                                  <a:latin typeface="Cambria Math" panose="02040503050406030204" pitchFamily="18" charset="0"/>
-                                </a:rPr>
-                                <m:t>𝑛</m:t>
-                              </m:r>
-                              <m:r>
-                                <a:rPr lang="en-US" sz="2400" b="0" i="1" smtClean="0">
-                                  <a:latin typeface="Cambria Math" panose="02040503050406030204" pitchFamily="18" charset="0"/>
-                                </a:rPr>
-                                <m:t>−1</m:t>
-                              </m:r>
-                            </m:den>
-                          </m:f>
-                          <m:nary>
-                            <m:naryPr>
-                              <m:chr m:val="∑"/>
-                              <m:ctrlPr>
-                                <a:rPr lang="en-US" sz="2400" b="0" i="1" smtClean="0">
-                                  <a:latin typeface="Cambria Math" panose="02040503050406030204" pitchFamily="18" charset="0"/>
-                                </a:rPr>
-                              </m:ctrlPr>
-                            </m:naryPr>
-                            <m:sub>
-                              <m:r>
-                                <a:rPr lang="en-US" sz="2400" b="0" i="1" smtClean="0">
-                                  <a:latin typeface="Cambria Math" panose="02040503050406030204" pitchFamily="18" charset="0"/>
-                                </a:rPr>
-                                <m:t>𝑖</m:t>
-                              </m:r>
-                              <m:r>
-                                <a:rPr lang="en-US" sz="2400" b="0" i="1" smtClean="0">
-                                  <a:latin typeface="Cambria Math" panose="02040503050406030204" pitchFamily="18" charset="0"/>
-                                </a:rPr>
-                                <m:t>=1</m:t>
-                              </m:r>
-                            </m:sub>
-                            <m:sup>
-                              <m:r>
-                                <a:rPr lang="en-US" sz="2400" b="0" i="1" smtClean="0">
-                                  <a:latin typeface="Cambria Math" panose="02040503050406030204" pitchFamily="18" charset="0"/>
-                                </a:rPr>
-                                <m:t>𝑛</m:t>
-                              </m:r>
-                            </m:sup>
-                            <m:e>
-                              <m:sSup>
-                                <m:sSupPr>
-                                  <m:ctrlPr>
-                                    <a:rPr lang="en-US" sz="2400" b="0" i="1" smtClean="0">
-                                      <a:latin typeface="Cambria Math" panose="02040503050406030204" pitchFamily="18" charset="0"/>
-                                    </a:rPr>
-                                  </m:ctrlPr>
-                                </m:sSupPr>
-                                <m:e>
-                                  <m:d>
-                                    <m:dPr>
-                                      <m:ctrlPr>
-                                        <a:rPr lang="en-US" sz="2400" b="0" i="1" smtClean="0">
-                                          <a:latin typeface="Cambria Math" panose="02040503050406030204" pitchFamily="18" charset="0"/>
-                                        </a:rPr>
-                                      </m:ctrlPr>
-                                    </m:dPr>
-                                    <m:e>
-                                      <m:sSub>
-                                        <m:sSubPr>
-                                          <m:ctrlPr>
-                                            <a:rPr lang="en-US" sz="2400" b="0" i="1" smtClean="0">
-                                              <a:latin typeface="Cambria Math" panose="02040503050406030204" pitchFamily="18" charset="0"/>
-                                            </a:rPr>
-                                          </m:ctrlPr>
-                                        </m:sSubPr>
-                                        <m:e>
-                                          <m:r>
-                                            <a:rPr lang="en-US" sz="2400" b="0" i="1" smtClean="0">
-                                              <a:latin typeface="Cambria Math" panose="02040503050406030204" pitchFamily="18" charset="0"/>
-                                            </a:rPr>
-                                            <m:t>𝑥</m:t>
-                                          </m:r>
-                                        </m:e>
-                                        <m:sub>
-                                          <m:r>
-                                            <a:rPr lang="en-US" sz="2400" b="0" i="1" smtClean="0">
-                                              <a:latin typeface="Cambria Math" panose="02040503050406030204" pitchFamily="18" charset="0"/>
-                                            </a:rPr>
-                                            <m:t>𝑖</m:t>
-                                          </m:r>
-                                        </m:sub>
-                                      </m:sSub>
-                                      <m:r>
-                                        <a:rPr lang="en-US" sz="2400" b="0" i="1" smtClean="0">
-                                          <a:latin typeface="Cambria Math" panose="02040503050406030204" pitchFamily="18" charset="0"/>
-                                        </a:rPr>
-                                        <m:t>−</m:t>
-                                      </m:r>
-                                      <m:acc>
-                                        <m:accPr>
-                                          <m:chr m:val="̅"/>
-                                          <m:ctrlPr>
-                                            <a:rPr lang="en-US" sz="2400" b="0" i="1" smtClean="0">
-                                              <a:latin typeface="Cambria Math" panose="02040503050406030204" pitchFamily="18" charset="0"/>
-                                            </a:rPr>
-                                          </m:ctrlPr>
-                                        </m:accPr>
-                                        <m:e>
-                                          <m:r>
-                                            <a:rPr lang="en-US" sz="2400" b="0" i="1" smtClean="0">
-                                              <a:latin typeface="Cambria Math" panose="02040503050406030204" pitchFamily="18" charset="0"/>
-                                            </a:rPr>
-                                            <m:t>𝑥</m:t>
-                                          </m:r>
-                                        </m:e>
-                                      </m:acc>
-                                    </m:e>
-                                  </m:d>
-                                </m:e>
-                                <m:sup>
-                                  <m:r>
-                                    <a:rPr lang="en-US" sz="2400" b="0" i="1" smtClean="0">
-                                      <a:latin typeface="Cambria Math" panose="02040503050406030204" pitchFamily="18" charset="0"/>
-                                    </a:rPr>
-                                    <m:t>2</m:t>
-                                  </m:r>
-                                </m:sup>
-                              </m:sSup>
-                            </m:e>
-                          </m:nary>
-                          <m:r>
-                            <a:rPr lang="en-US" sz="2400" b="0" i="1" smtClean="0">
-                              <a:latin typeface="Cambria Math" panose="02040503050406030204" pitchFamily="18" charset="0"/>
-                            </a:rPr>
-                            <m:t> </m:t>
-                          </m:r>
-                        </m:e>
-                      </m:rad>
-                    </m:oMath>
-                  </m:oMathPara>
-                </a14:m>
-                <a:endParaRPr lang="en-US" sz="2400" dirty="0"/>
-              </a:p>
-              <a:p>
-                <a:endParaRPr lang="en-US" dirty="0"/>
-              </a:p>
-              <a:p>
-                <a:r>
-                  <a:rPr lang="en-US" dirty="0"/>
-                  <a:t>The standard deviation represents (roughly) the average distance of an observation from the mean </a:t>
-                </a:r>
-              </a:p>
-              <a:p>
-                <a:endParaRPr lang="en-US" dirty="0"/>
-              </a:p>
-              <a:p>
-                <a:r>
-                  <a:rPr lang="en-US" dirty="0"/>
-                  <a:t>The greater </a:t>
-                </a:r>
-                <a14:m>
-                  <m:oMath xmlns:m="http://schemas.openxmlformats.org/officeDocument/2006/math">
-                    <m:r>
-                      <a:rPr lang="en-US" b="0" i="1" smtClean="0">
-                        <a:latin typeface="Cambria Math" panose="02040503050406030204" pitchFamily="18" charset="0"/>
-                      </a:rPr>
-                      <m:t>𝑠</m:t>
-                    </m:r>
-                  </m:oMath>
-                </a14:m>
-                <a:r>
-                  <a:rPr lang="en-US" dirty="0"/>
-                  <a:t> is the greater the variability in the data is</a:t>
-                </a:r>
-              </a:p>
-              <a:p>
-                <a:endParaRPr lang="en-US" dirty="0"/>
-              </a:p>
-              <a:p>
-                <a:r>
-                  <a:rPr lang="en-US" dirty="0"/>
-                  <a:t>We denote the population parameter for the variance and standard deviation using </a:t>
-                </a:r>
-                <a14:m>
-                  <m:oMath xmlns:m="http://schemas.openxmlformats.org/officeDocument/2006/math">
-                    <m:r>
-                      <a:rPr lang="en-US" b="0" i="1" smtClean="0">
-                        <a:latin typeface="Cambria Math" panose="02040503050406030204" pitchFamily="18" charset="0"/>
-                      </a:rPr>
-                      <m:t>𝜎</m:t>
-                    </m:r>
-                  </m:oMath>
-                </a14:m>
-                <a:r>
-                  <a:rPr lang="en-US" dirty="0"/>
-                  <a:t> for </a:t>
-                </a:r>
-                <a14:m>
-                  <m:oMath xmlns:m="http://schemas.openxmlformats.org/officeDocument/2006/math">
-                    <m:r>
-                      <a:rPr lang="en-US" b="0" i="1" smtClean="0">
-                        <a:latin typeface="Cambria Math" panose="02040503050406030204" pitchFamily="18" charset="0"/>
-                      </a:rPr>
-                      <m:t>𝑠</m:t>
-                    </m:r>
-                  </m:oMath>
-                </a14:m>
-                <a:r>
-                  <a:rPr lang="en-US" dirty="0"/>
-                  <a:t> and </a:t>
-                </a:r>
-                <a14:m>
-                  <m:oMath xmlns:m="http://schemas.openxmlformats.org/officeDocument/2006/math">
-                    <m:sSup>
-                      <m:sSupPr>
-                        <m:ctrlPr>
-                          <a:rPr lang="en-US" b="0" i="1" smtClean="0">
-                            <a:latin typeface="Cambria Math" panose="02040503050406030204" pitchFamily="18" charset="0"/>
-                          </a:rPr>
-                        </m:ctrlPr>
-                      </m:sSupPr>
-                      <m:e>
-                        <m:r>
-                          <a:rPr lang="en-US" b="0" i="1" smtClean="0">
-                            <a:latin typeface="Cambria Math" panose="02040503050406030204" pitchFamily="18" charset="0"/>
-                          </a:rPr>
-                          <m:t>𝜎</m:t>
-                        </m:r>
-                      </m:e>
-                      <m:sup>
-                        <m:r>
-                          <a:rPr lang="en-US" b="0" i="1" smtClean="0">
-                            <a:latin typeface="Cambria Math" panose="02040503050406030204" pitchFamily="18" charset="0"/>
-                          </a:rPr>
-                          <m:t>2</m:t>
-                        </m:r>
-                      </m:sup>
-                    </m:sSup>
-                  </m:oMath>
-                </a14:m>
-                <a:r>
-                  <a:rPr lang="en-US" dirty="0"/>
-                  <a:t> for </a:t>
-                </a:r>
-                <a14:m>
-                  <m:oMath xmlns:m="http://schemas.openxmlformats.org/officeDocument/2006/math">
-                    <m:sSup>
-                      <m:sSupPr>
-                        <m:ctrlPr>
-                          <a:rPr lang="en-US" b="0" i="1" smtClean="0">
-                            <a:latin typeface="Cambria Math" panose="02040503050406030204" pitchFamily="18" charset="0"/>
-                          </a:rPr>
-                        </m:ctrlPr>
-                      </m:sSupPr>
-                      <m:e>
-                        <m:r>
-                          <a:rPr lang="en-US" b="0" i="1" smtClean="0">
-                            <a:latin typeface="Cambria Math" panose="02040503050406030204" pitchFamily="18" charset="0"/>
-                          </a:rPr>
-                          <m:t>𝑠</m:t>
-                        </m:r>
-                      </m:e>
-                      <m:sup>
-                        <m:r>
-                          <a:rPr lang="en-US" b="0" i="1" smtClean="0">
-                            <a:latin typeface="Cambria Math" panose="02040503050406030204" pitchFamily="18" charset="0"/>
-                          </a:rPr>
-                          <m:t>2</m:t>
-                        </m:r>
-                      </m:sup>
-                    </m:sSup>
-                  </m:oMath>
-                </a14:m>
-                <a:endParaRPr lang="en-US" dirty="0"/>
-              </a:p>
-            </p:txBody>
-          </p:sp>
-        </mc:Choice>
-        <mc:Fallback xmlns="">
-          <p:sp>
-            <p:nvSpPr>
-              <p:cNvPr id="3" name="Content Placeholder 2">
-                <a:extLst>
-                  <a:ext uri="{FF2B5EF4-FFF2-40B4-BE49-F238E27FC236}">
-                    <a16:creationId xmlns:a16="http://schemas.microsoft.com/office/drawing/2014/main" id="{F801D609-D493-78C3-4B57-D24A155F0AAF}"/>
-                  </a:ext>
-                </a:extLst>
-              </p:cNvPr>
-              <p:cNvSpPr>
-                <a:spLocks noGrp="1" noRot="1" noChangeAspect="1" noMove="1" noResize="1" noEditPoints="1" noAdjustHandles="1" noChangeArrowheads="1" noChangeShapeType="1" noTextEdit="1"/>
-              </p:cNvSpPr>
-              <p:nvPr>
-                <p:ph idx="1"/>
-              </p:nvPr>
-            </p:nvSpPr>
-            <p:spPr>
-              <a:xfrm>
-                <a:off x="838200" y="1548533"/>
-                <a:ext cx="10515600" cy="4935393"/>
-              </a:xfrm>
-              <a:blipFill>
-                <a:blip r:embed="rId2"/>
-                <a:stretch>
-                  <a:fillRect l="-812" t="-2840" b="-1605"/>
-                </a:stretch>
-              </a:blipFill>
-            </p:spPr>
-            <p:txBody>
-              <a:bodyPr/>
-              <a:lstStyle/>
-              <a:p>
-                <a:r>
-                  <a:rPr lang="en-US">
-                    <a:noFill/>
-                  </a:rPr>
-                  <a:t> </a:t>
-                </a:r>
-              </a:p>
-            </p:txBody>
-          </p:sp>
-        </mc:Fallback>
-      </mc:AlternateContent>
-    </p:spTree>
-    <p:extLst>
-      <p:ext uri="{BB962C8B-B14F-4D97-AF65-F5344CB8AC3E}">
-        <p14:creationId xmlns:p14="http://schemas.microsoft.com/office/powerpoint/2010/main" val="1106632737"/>
-      </p:ext>
-    </p:extLst>
-  </p:cSld>
-  <p:clrMapOvr>
-    <a:masterClrMapping/>
-  </p:clrMapOvr>
-</p:sld>
-</file>
-
-<file path=ppt/slides/slide25.xml><?xml version="1.0" encoding="utf-8"?>
-<p:sld xmlns:a="http://schemas.openxmlformats.org/drawingml/2006/main" xmlns:r="http://schemas.openxmlformats.org/officeDocument/2006/relationships" xmlns:p="http://schemas.openxmlformats.org/presentationml/2006/main">
-  <p:cSld>
-    <p:spTree>
-      <p:nvGrpSpPr>
-        <p:cNvPr id="1" name=""/>
-        <p:cNvGrpSpPr/>
-        <p:nvPr/>
-      </p:nvGrpSpPr>
-      <p:grpSpPr>
-        <a:xfrm>
-          <a:off x="0" y="0"/>
-          <a:ext cx="0" cy="0"/>
-          <a:chOff x="0" y="0"/>
-          <a:chExt cx="0" cy="0"/>
-        </a:xfrm>
-      </p:grpSpPr>
-      <mc:AlternateContent xmlns:mc="http://schemas.openxmlformats.org/markup-compatibility/2006" xmlns:a14="http://schemas.microsoft.com/office/drawing/2010/main">
-        <mc:Choice Requires="a14">
-          <p:sp>
-            <p:nvSpPr>
-              <p:cNvPr id="2" name="Title 1">
-                <a:extLst>
-                  <a:ext uri="{FF2B5EF4-FFF2-40B4-BE49-F238E27FC236}">
-                    <a16:creationId xmlns:a16="http://schemas.microsoft.com/office/drawing/2014/main" id="{1DD5E1B0-DD07-8EDA-1858-2D2EA2B4B384}"/>
-                  </a:ext>
-                </a:extLst>
-              </p:cNvPr>
-              <p:cNvSpPr>
-                <a:spLocks noGrp="1"/>
-              </p:cNvSpPr>
-              <p:nvPr>
-                <p:ph type="title"/>
-              </p:nvPr>
-            </p:nvSpPr>
-            <p:spPr/>
-            <p:txBody>
-              <a:bodyPr/>
-              <a:lstStyle/>
-              <a:p>
-                <a:r>
-                  <a:rPr lang="en-US" dirty="0"/>
-                  <a:t>Why divide by </a:t>
-                </a:r>
-                <a14:m>
-                  <m:oMath xmlns:m="http://schemas.openxmlformats.org/officeDocument/2006/math">
-                    <m:r>
-                      <a:rPr lang="en-US" b="0" i="1" smtClean="0">
-                        <a:latin typeface="Cambria Math" panose="02040503050406030204" pitchFamily="18" charset="0"/>
-                      </a:rPr>
-                      <m:t>𝑛</m:t>
-                    </m:r>
-                    <m:r>
-                      <a:rPr lang="en-US" b="0" i="1" smtClean="0">
-                        <a:latin typeface="Cambria Math" panose="02040503050406030204" pitchFamily="18" charset="0"/>
-                      </a:rPr>
-                      <m:t>−1</m:t>
-                    </m:r>
-                  </m:oMath>
-                </a14:m>
-                <a:r>
-                  <a:rPr lang="en-US" dirty="0"/>
-                  <a:t> ?</a:t>
-                </a:r>
-              </a:p>
-            </p:txBody>
-          </p:sp>
-        </mc:Choice>
-        <mc:Fallback xmlns="">
-          <p:sp>
-            <p:nvSpPr>
-              <p:cNvPr id="2" name="Title 1">
-                <a:extLst>
-                  <a:ext uri="{FF2B5EF4-FFF2-40B4-BE49-F238E27FC236}">
-                    <a16:creationId xmlns:a16="http://schemas.microsoft.com/office/drawing/2014/main" id="{1DD5E1B0-DD07-8EDA-1858-2D2EA2B4B384}"/>
-                  </a:ext>
-                </a:extLst>
-              </p:cNvPr>
-              <p:cNvSpPr>
-                <a:spLocks noGrp="1" noRot="1" noChangeAspect="1" noMove="1" noResize="1" noEditPoints="1" noAdjustHandles="1" noChangeArrowheads="1" noChangeShapeType="1" noTextEdit="1"/>
-              </p:cNvSpPr>
-              <p:nvPr>
-                <p:ph type="title"/>
-              </p:nvPr>
-            </p:nvSpPr>
-            <p:spPr>
-              <a:blipFill>
-                <a:blip r:embed="rId2"/>
-                <a:stretch>
-                  <a:fillRect l="-2377"/>
-                </a:stretch>
-              </a:blipFill>
-            </p:spPr>
-            <p:txBody>
-              <a:bodyPr/>
-              <a:lstStyle/>
-              <a:p>
-                <a:r>
-                  <a:rPr lang="en-US">
-                    <a:noFill/>
-                  </a:rPr>
-                  <a:t> </a:t>
-                </a:r>
-              </a:p>
-            </p:txBody>
-          </p:sp>
-        </mc:Fallback>
-      </mc:AlternateContent>
-      <mc:AlternateContent xmlns:mc="http://schemas.openxmlformats.org/markup-compatibility/2006" xmlns:a14="http://schemas.microsoft.com/office/drawing/2010/main">
-        <mc:Choice Requires="a14">
-          <p:sp>
-            <p:nvSpPr>
-              <p:cNvPr id="3" name="Content Placeholder 2">
-                <a:extLst>
-                  <a:ext uri="{FF2B5EF4-FFF2-40B4-BE49-F238E27FC236}">
-                    <a16:creationId xmlns:a16="http://schemas.microsoft.com/office/drawing/2014/main" id="{51A4BF34-A2FA-6993-0CE4-3573B865FE8F}"/>
-                  </a:ext>
-                </a:extLst>
-              </p:cNvPr>
-              <p:cNvSpPr>
-                <a:spLocks noGrp="1"/>
-              </p:cNvSpPr>
-              <p:nvPr>
-                <p:ph idx="1"/>
-              </p:nvPr>
-            </p:nvSpPr>
-            <p:spPr/>
-            <p:txBody>
-              <a:bodyPr>
-                <a:normAutofit lnSpcReduction="10000"/>
-              </a:bodyPr>
-              <a:lstStyle/>
-              <a:p>
-                <a:r>
-                  <a:rPr lang="en-US" dirty="0"/>
-                  <a:t>We divide by </a:t>
-                </a:r>
-                <a14:m>
-                  <m:oMath xmlns:m="http://schemas.openxmlformats.org/officeDocument/2006/math">
-                    <m:r>
-                      <a:rPr lang="en-US" b="0" i="1" smtClean="0">
-                        <a:latin typeface="Cambria Math" panose="02040503050406030204" pitchFamily="18" charset="0"/>
-                      </a:rPr>
-                      <m:t>𝑛</m:t>
-                    </m:r>
-                    <m:r>
-                      <a:rPr lang="en-US" b="0" i="1" smtClean="0">
-                        <a:latin typeface="Cambria Math" panose="02040503050406030204" pitchFamily="18" charset="0"/>
-                      </a:rPr>
-                      <m:t>−1</m:t>
-                    </m:r>
-                  </m:oMath>
-                </a14:m>
-                <a:r>
-                  <a:rPr lang="en-US" dirty="0"/>
-                  <a:t> because we have only </a:t>
-                </a:r>
-                <a14:m>
-                  <m:oMath xmlns:m="http://schemas.openxmlformats.org/officeDocument/2006/math">
-                    <m:r>
-                      <a:rPr lang="en-US" b="0" i="1" smtClean="0">
-                        <a:latin typeface="Cambria Math" panose="02040503050406030204" pitchFamily="18" charset="0"/>
-                      </a:rPr>
-                      <m:t>𝑛</m:t>
-                    </m:r>
-                    <m:r>
-                      <a:rPr lang="en-US" b="0" i="1" smtClean="0">
-                        <a:latin typeface="Cambria Math" panose="02040503050406030204" pitchFamily="18" charset="0"/>
-                      </a:rPr>
-                      <m:t>−1 </m:t>
-                    </m:r>
-                  </m:oMath>
-                </a14:m>
-                <a:r>
-                  <a:rPr lang="en-US" dirty="0"/>
-                  <a:t>pieces of independent information for </a:t>
-                </a:r>
-                <a14:m>
-                  <m:oMath xmlns:m="http://schemas.openxmlformats.org/officeDocument/2006/math">
-                    <m:sSup>
-                      <m:sSupPr>
-                        <m:ctrlPr>
-                          <a:rPr lang="en-US" b="0" i="1" smtClean="0">
-                            <a:latin typeface="Cambria Math" panose="02040503050406030204" pitchFamily="18" charset="0"/>
-                          </a:rPr>
-                        </m:ctrlPr>
-                      </m:sSupPr>
-                      <m:e>
-                        <m:r>
-                          <a:rPr lang="en-US" b="0" i="1" smtClean="0">
-                            <a:latin typeface="Cambria Math" panose="02040503050406030204" pitchFamily="18" charset="0"/>
-                          </a:rPr>
-                          <m:t>𝑠</m:t>
-                        </m:r>
-                      </m:e>
-                      <m:sup>
-                        <m:r>
-                          <a:rPr lang="en-US" b="0" i="1" smtClean="0">
-                            <a:latin typeface="Cambria Math" panose="02040503050406030204" pitchFamily="18" charset="0"/>
-                          </a:rPr>
-                          <m:t>2</m:t>
-                        </m:r>
-                      </m:sup>
-                    </m:sSup>
-                  </m:oMath>
-                </a14:m>
-                <a:r>
-                  <a:rPr lang="en-US" dirty="0"/>
-                  <a:t> </a:t>
-                </a:r>
-              </a:p>
-              <a:p>
-                <a:endParaRPr lang="en-US" dirty="0"/>
-              </a:p>
-              <a:p>
-                <a:r>
-                  <a:rPr lang="en-US" dirty="0"/>
-                  <a:t>Since the sum of the deviations must add to zero, then if we know the first </a:t>
-                </a:r>
-                <a14:m>
-                  <m:oMath xmlns:m="http://schemas.openxmlformats.org/officeDocument/2006/math">
-                    <m:r>
-                      <a:rPr lang="en-US" b="0" i="1" smtClean="0">
-                        <a:latin typeface="Cambria Math" panose="02040503050406030204" pitchFamily="18" charset="0"/>
-                      </a:rPr>
-                      <m:t>𝑛</m:t>
-                    </m:r>
-                    <m:r>
-                      <a:rPr lang="en-US" b="0" i="1" smtClean="0">
-                        <a:latin typeface="Cambria Math" panose="02040503050406030204" pitchFamily="18" charset="0"/>
-                      </a:rPr>
-                      <m:t>−1</m:t>
-                    </m:r>
-                  </m:oMath>
-                </a14:m>
-                <a:r>
-                  <a:rPr lang="en-US" dirty="0"/>
-                  <a:t> deviations we can always figure out the last one</a:t>
-                </a:r>
-              </a:p>
-              <a:p>
-                <a:endParaRPr lang="en-US" dirty="0"/>
-              </a:p>
-              <a:p>
-                <a:r>
-                  <a:rPr lang="en-US" dirty="0"/>
-                  <a:t>Ex.) suppose we have two data points and the deviation of the first data point is </a:t>
-                </a:r>
-                <a14:m>
-                  <m:oMath xmlns:m="http://schemas.openxmlformats.org/officeDocument/2006/math">
-                    <m:r>
-                      <a:rPr lang="en-US" b="0" i="1" smtClean="0">
-                        <a:latin typeface="Cambria Math" panose="02040503050406030204" pitchFamily="18" charset="0"/>
-                      </a:rPr>
-                      <m:t>𝑥</m:t>
-                    </m:r>
-                    <m:r>
-                      <a:rPr lang="en-US" b="0" i="1" smtClean="0">
-                        <a:latin typeface="Cambria Math" panose="02040503050406030204" pitchFamily="18" charset="0"/>
-                      </a:rPr>
-                      <m:t> −</m:t>
-                    </m:r>
-                    <m:acc>
-                      <m:accPr>
-                        <m:chr m:val="̅"/>
-                        <m:ctrlPr>
-                          <a:rPr lang="en-US" b="0" i="1" smtClean="0">
-                            <a:latin typeface="Cambria Math" panose="02040503050406030204" pitchFamily="18" charset="0"/>
-                          </a:rPr>
-                        </m:ctrlPr>
-                      </m:accPr>
-                      <m:e>
-                        <m:r>
-                          <a:rPr lang="en-US" b="0" i="1" smtClean="0">
-                            <a:latin typeface="Cambria Math" panose="02040503050406030204" pitchFamily="18" charset="0"/>
-                          </a:rPr>
-                          <m:t>𝑥</m:t>
-                        </m:r>
-                      </m:e>
-                    </m:acc>
-                    <m:r>
-                      <a:rPr lang="en-US" b="0" i="1" smtClean="0">
-                        <a:latin typeface="Cambria Math" panose="02040503050406030204" pitchFamily="18" charset="0"/>
-                      </a:rPr>
-                      <m:t>=−5</m:t>
-                    </m:r>
-                  </m:oMath>
-                </a14:m>
-                <a:r>
-                  <a:rPr lang="en-US" dirty="0"/>
-                  <a:t> </a:t>
-                </a:r>
-              </a:p>
-              <a:p>
-                <a:pPr lvl="1"/>
-                <a:r>
-                  <a:rPr lang="en-US" dirty="0"/>
-                  <a:t>Then the deviation of the second data point </a:t>
-                </a:r>
-                <a:r>
-                  <a:rPr lang="en-US" u="sng" dirty="0"/>
-                  <a:t>has</a:t>
-                </a:r>
-                <a:r>
-                  <a:rPr lang="en-US" dirty="0"/>
-                  <a:t> to be 5 for the sum of deviations to be zero. </a:t>
-                </a:r>
-              </a:p>
-            </p:txBody>
-          </p:sp>
-        </mc:Choice>
-        <mc:Fallback xmlns="">
-          <p:sp>
-            <p:nvSpPr>
-              <p:cNvPr id="3" name="Content Placeholder 2">
-                <a:extLst>
-                  <a:ext uri="{FF2B5EF4-FFF2-40B4-BE49-F238E27FC236}">
-                    <a16:creationId xmlns:a16="http://schemas.microsoft.com/office/drawing/2014/main" id="{51A4BF34-A2FA-6993-0CE4-3573B865FE8F}"/>
-                  </a:ext>
-                </a:extLst>
-              </p:cNvPr>
-              <p:cNvSpPr>
-                <a:spLocks noGrp="1" noRot="1" noChangeAspect="1" noMove="1" noResize="1" noEditPoints="1" noAdjustHandles="1" noChangeArrowheads="1" noChangeShapeType="1" noTextEdit="1"/>
-              </p:cNvSpPr>
-              <p:nvPr>
-                <p:ph idx="1"/>
-              </p:nvPr>
-            </p:nvSpPr>
-            <p:spPr>
-              <a:blipFill>
-                <a:blip r:embed="rId3"/>
-                <a:stretch>
-                  <a:fillRect l="-1043" t="-3081" r="-1681"/>
-                </a:stretch>
-              </a:blipFill>
-            </p:spPr>
-            <p:txBody>
-              <a:bodyPr/>
-              <a:lstStyle/>
-              <a:p>
-                <a:r>
-                  <a:rPr lang="en-US">
-                    <a:noFill/>
-                  </a:rPr>
-                  <a:t> </a:t>
-                </a:r>
-              </a:p>
-            </p:txBody>
-          </p:sp>
-        </mc:Fallback>
-      </mc:AlternateContent>
-    </p:spTree>
-    <p:extLst>
-      <p:ext uri="{BB962C8B-B14F-4D97-AF65-F5344CB8AC3E}">
-        <p14:creationId xmlns:p14="http://schemas.microsoft.com/office/powerpoint/2010/main" val="3975655598"/>
-      </p:ext>
-    </p:extLst>
-  </p:cSld>
-  <p:clrMapOvr>
-    <a:masterClrMapping/>
-  </p:clrMapOvr>
-</p:sld>
-</file>
-
-<file path=ppt/slides/slide26.xml><?xml version="1.0" encoding="utf-8"?>
-<p:sld xmlns:a="http://schemas.openxmlformats.org/drawingml/2006/main" xmlns:r="http://schemas.openxmlformats.org/officeDocument/2006/relationships" xmlns:p="http://schemas.openxmlformats.org/presentationml/2006/main">
-  <p:cSld>
-    <p:bg>
-      <p:bgPr>
-        <a:solidFill>
-          <a:schemeClr val="bg1"/>
-        </a:solidFill>
-        <a:effectLst/>
-      </p:bgPr>
-    </p:bg>
-    <p:spTree>
-      <p:nvGrpSpPr>
-        <p:cNvPr id="1" name=""/>
-        <p:cNvGrpSpPr/>
-        <p:nvPr/>
-      </p:nvGrpSpPr>
-      <p:grpSpPr>
-        <a:xfrm>
-          <a:off x="0" y="0"/>
-          <a:ext cx="0" cy="0"/>
-          <a:chOff x="0" y="0"/>
-          <a:chExt cx="0" cy="0"/>
-        </a:xfrm>
-      </p:grpSpPr>
-      <p:sp useBgFill="1">
-        <p:nvSpPr>
-          <p:cNvPr id="10" name="Rectangle 9">
-            <a:extLst>
-              <a:ext uri="{FF2B5EF4-FFF2-40B4-BE49-F238E27FC236}">
-                <a16:creationId xmlns:a16="http://schemas.microsoft.com/office/drawing/2014/main" id="{22587ECF-85E9-4393-9D87-8EB6F3F6C208}"/>
-              </a:ext>
-              <a:ext uri="{C183D7F6-B498-43B3-948B-1728B52AA6E4}">
-                <adec:decorative xmlns:adec="http://schemas.microsoft.com/office/drawing/2017/decorative" val="1"/>
-              </a:ext>
-            </a:extLst>
-          </p:cNvPr>
-          <p:cNvSpPr>
-            <a:spLocks noGrp="1" noRot="1" noChangeAspect="1" noMove="1" noResize="1" noEditPoints="1" noAdjustHandles="1" noChangeArrowheads="1" noChangeShapeType="1" noTextEdit="1"/>
-          </p:cNvSpPr>
-          <p:nvPr>
-            <p:extLst>
-              <p:ext uri="{386F3935-93C4-4BCD-93E2-E3B085C9AB24}">
-                <p16:designElem xmlns:p16="http://schemas.microsoft.com/office/powerpoint/2015/main" val="1"/>
-              </p:ext>
-            </p:extLst>
-          </p:nvPr>
-        </p:nvSpPr>
-        <p:spPr>
-          <a:xfrm>
-            <a:off x="-1" y="0"/>
-            <a:ext cx="12188952" cy="6858000"/>
-          </a:xfrm>
-          <a:prstGeom prst="rect">
-            <a:avLst/>
-          </a:prstGeom>
-          <a:ln>
-            <a:noFill/>
-          </a:ln>
-        </p:spPr>
-        <p:style>
-          <a:lnRef idx="2">
-            <a:schemeClr val="accent1">
-              <a:shade val="50000"/>
-            </a:schemeClr>
-          </a:lnRef>
-          <a:fillRef idx="1">
-            <a:schemeClr val="accent1"/>
-          </a:fillRef>
-          <a:effectRef idx="0">
-            <a:schemeClr val="accent1"/>
-          </a:effectRef>
-          <a:fontRef idx="minor">
-            <a:schemeClr val="lt1"/>
-          </a:fontRef>
-        </p:style>
-        <p:txBody>
-          <a:bodyPr rtlCol="0" anchor="ctr"/>
-          <a:lstStyle/>
-          <a:p>
-            <a:pPr marL="0" marR="0" lvl="0" indent="0" algn="ctr" defTabSz="914400" rtl="0" eaLnBrk="1" fontAlgn="auto" latinLnBrk="0" hangingPunct="1">
-              <a:lnSpc>
-                <a:spcPct val="100000"/>
-              </a:lnSpc>
-              <a:spcBef>
-                <a:spcPts val="0"/>
-              </a:spcBef>
-              <a:spcAft>
-                <a:spcPts val="0"/>
-              </a:spcAft>
-              <a:buClrTx/>
-              <a:buSzTx/>
-              <a:buFontTx/>
-              <a:buNone/>
-              <a:tabLst/>
-              <a:defRPr/>
-            </a:pPr>
-            <a:endParaRPr kumimoji="0" lang="en-US" sz="1800" b="0" i="0" u="none" strike="noStrike" kern="1200" cap="none" spc="0" normalizeH="0" baseline="0" noProof="0">
-              <a:ln>
-                <a:noFill/>
-              </a:ln>
-              <a:solidFill>
-                <a:prstClr val="white"/>
-              </a:solidFill>
-              <a:effectLst/>
-              <a:uLnTx/>
-              <a:uFillTx/>
-              <a:latin typeface="Calibri" panose="020F0502020204030204"/>
-              <a:ea typeface="+mn-ea"/>
-              <a:cs typeface="+mn-cs"/>
-            </a:endParaRPr>
-          </a:p>
-        </p:txBody>
-      </p:sp>
-      <mc:AlternateContent xmlns:mc="http://schemas.openxmlformats.org/markup-compatibility/2006" xmlns:a14="http://schemas.microsoft.com/office/drawing/2010/main">
-        <mc:Choice Requires="a14">
-          <p:sp>
-            <p:nvSpPr>
-              <p:cNvPr id="2" name="Title 1">
-                <a:extLst>
-                  <a:ext uri="{FF2B5EF4-FFF2-40B4-BE49-F238E27FC236}">
-                    <a16:creationId xmlns:a16="http://schemas.microsoft.com/office/drawing/2014/main" id="{6EA75132-6122-451D-8580-53616DB7E950}"/>
-                  </a:ext>
-                </a:extLst>
-              </p:cNvPr>
-              <p:cNvSpPr>
-                <a:spLocks noGrp="1"/>
-              </p:cNvSpPr>
-              <p:nvPr>
-                <p:ph type="title"/>
-              </p:nvPr>
-            </p:nvSpPr>
-            <p:spPr>
-              <a:xfrm>
-                <a:off x="838199" y="537883"/>
-                <a:ext cx="4783697" cy="1942810"/>
-              </a:xfrm>
-            </p:spPr>
-            <p:txBody>
-              <a:bodyPr vert="horz" lIns="91440" tIns="45720" rIns="91440" bIns="45720" rtlCol="0" anchor="b">
-                <a:normAutofit/>
-              </a:bodyPr>
-              <a:lstStyle/>
-              <a:p>
-                <a:r>
-                  <a:rPr lang="en-US" sz="4000" kern="1200" dirty="0">
-                    <a:solidFill>
-                      <a:schemeClr val="tx1"/>
-                    </a:solidFill>
-                    <a:latin typeface="+mj-lt"/>
-                    <a:ea typeface="+mj-ea"/>
-                    <a:cs typeface="+mj-cs"/>
-                  </a:rPr>
-                  <a:t>Try it out: Computing </a:t>
-                </a:r>
-                <a14:m>
-                  <m:oMath xmlns:m="http://schemas.openxmlformats.org/officeDocument/2006/math">
-                    <m:r>
-                      <a:rPr lang="en-US" sz="4000" b="0" i="1" kern="1200" smtClean="0">
-                        <a:solidFill>
-                          <a:schemeClr val="tx1"/>
-                        </a:solidFill>
-                        <a:latin typeface="Cambria Math" panose="02040503050406030204" pitchFamily="18" charset="0"/>
-                        <a:ea typeface="+mj-ea"/>
-                        <a:cs typeface="+mj-cs"/>
-                      </a:rPr>
-                      <m:t>𝑠</m:t>
-                    </m:r>
-                  </m:oMath>
-                </a14:m>
-                <a:r>
-                  <a:rPr lang="en-US" sz="4000" kern="1200" dirty="0">
-                    <a:solidFill>
-                      <a:schemeClr val="tx1"/>
-                    </a:solidFill>
-                    <a:latin typeface="+mj-lt"/>
-                    <a:ea typeface="+mj-ea"/>
-                    <a:cs typeface="+mj-cs"/>
-                  </a:rPr>
-                  <a:t> and </a:t>
-                </a:r>
-                <a14:m>
-                  <m:oMath xmlns:m="http://schemas.openxmlformats.org/officeDocument/2006/math">
-                    <m:sSup>
-                      <m:sSupPr>
-                        <m:ctrlPr>
-                          <a:rPr lang="en-US" sz="4000" b="0" i="1" kern="1200" smtClean="0">
-                            <a:solidFill>
-                              <a:schemeClr val="tx1"/>
-                            </a:solidFill>
-                            <a:latin typeface="Cambria Math" panose="02040503050406030204" pitchFamily="18" charset="0"/>
-                            <a:ea typeface="+mj-ea"/>
-                            <a:cs typeface="+mj-cs"/>
-                          </a:rPr>
-                        </m:ctrlPr>
-                      </m:sSupPr>
-                      <m:e>
-                        <m:r>
-                          <a:rPr lang="en-US" sz="4000" b="0" i="1" kern="1200" smtClean="0">
-                            <a:solidFill>
-                              <a:schemeClr val="tx1"/>
-                            </a:solidFill>
-                            <a:latin typeface="Cambria Math" panose="02040503050406030204" pitchFamily="18" charset="0"/>
-                            <a:ea typeface="+mj-ea"/>
-                            <a:cs typeface="+mj-cs"/>
-                          </a:rPr>
-                          <m:t>𝑠</m:t>
-                        </m:r>
-                      </m:e>
-                      <m:sup>
-                        <m:r>
-                          <a:rPr lang="en-US" sz="4000" b="0" i="1" kern="1200" smtClean="0">
-                            <a:solidFill>
-                              <a:schemeClr val="tx1"/>
-                            </a:solidFill>
-                            <a:latin typeface="Cambria Math" panose="02040503050406030204" pitchFamily="18" charset="0"/>
-                            <a:ea typeface="+mj-ea"/>
-                            <a:cs typeface="+mj-cs"/>
-                          </a:rPr>
-                          <m:t>2</m:t>
-                        </m:r>
-                      </m:sup>
-                    </m:sSup>
-                  </m:oMath>
-                </a14:m>
-                <a:r>
-                  <a:rPr lang="en-US" sz="4000" kern="1200" dirty="0">
-                    <a:solidFill>
-                      <a:schemeClr val="tx1"/>
-                    </a:solidFill>
-                    <a:latin typeface="+mj-lt"/>
-                    <a:ea typeface="+mj-ea"/>
-                    <a:cs typeface="+mj-cs"/>
-                  </a:rPr>
-                  <a:t> </a:t>
-                </a:r>
-              </a:p>
-            </p:txBody>
-          </p:sp>
-        </mc:Choice>
-        <mc:Fallback xmlns="">
-          <p:sp>
-            <p:nvSpPr>
-              <p:cNvPr id="2" name="Title 1">
-                <a:extLst>
-                  <a:ext uri="{FF2B5EF4-FFF2-40B4-BE49-F238E27FC236}">
-                    <a16:creationId xmlns:a16="http://schemas.microsoft.com/office/drawing/2014/main" id="{6EA75132-6122-451D-8580-53616DB7E950}"/>
-                  </a:ext>
-                </a:extLst>
-              </p:cNvPr>
-              <p:cNvSpPr>
-                <a:spLocks noGrp="1" noRot="1" noChangeAspect="1" noMove="1" noResize="1" noEditPoints="1" noAdjustHandles="1" noChangeArrowheads="1" noChangeShapeType="1" noTextEdit="1"/>
-              </p:cNvSpPr>
-              <p:nvPr>
-                <p:ph type="title"/>
-              </p:nvPr>
-            </p:nvSpPr>
-            <p:spPr>
-              <a:xfrm>
-                <a:off x="838199" y="537883"/>
-                <a:ext cx="4783697" cy="1942810"/>
-              </a:xfrm>
-              <a:blipFill>
-                <a:blip r:embed="rId2"/>
-                <a:stretch>
-                  <a:fillRect l="-4459" r="-892" b="-13793"/>
-                </a:stretch>
-              </a:blipFill>
-            </p:spPr>
-            <p:txBody>
-              <a:bodyPr/>
-              <a:lstStyle/>
-              <a:p>
-                <a:r>
-                  <a:rPr lang="en-US">
-                    <a:noFill/>
-                  </a:rPr>
-                  <a:t> </a:t>
-                </a:r>
-              </a:p>
-            </p:txBody>
-          </p:sp>
-        </mc:Fallback>
-      </mc:AlternateContent>
-      <mc:AlternateContent xmlns:mc="http://schemas.openxmlformats.org/markup-compatibility/2006" xmlns:a14="http://schemas.microsoft.com/office/drawing/2010/main">
-        <mc:Choice Requires="a14">
-          <p:sp>
-            <p:nvSpPr>
-              <p:cNvPr id="4" name="Content Placeholder 2">
-                <a:extLst>
-                  <a:ext uri="{FF2B5EF4-FFF2-40B4-BE49-F238E27FC236}">
-                    <a16:creationId xmlns:a16="http://schemas.microsoft.com/office/drawing/2014/main" id="{C933D906-CF81-5AD4-2902-D9DD0E0EF8B7}"/>
-                  </a:ext>
-                </a:extLst>
-              </p:cNvPr>
-              <p:cNvSpPr txBox="1">
-                <a:spLocks/>
-              </p:cNvSpPr>
-              <p:nvPr/>
-            </p:nvSpPr>
-            <p:spPr>
-              <a:xfrm>
-                <a:off x="838199" y="2686323"/>
-                <a:ext cx="4783697" cy="3433583"/>
-              </a:xfrm>
-              <a:prstGeom prst="rect">
-                <a:avLst/>
-              </a:prstGeom>
-            </p:spPr>
-            <p:txBody>
-              <a:bodyPr vert="horz" lIns="91440" tIns="45720" rIns="91440" bIns="45720" rtlCol="0">
-                <a:normAutofit/>
-              </a:bodyPr>
-              <a:lstStyle>
-                <a:lvl1pPr marL="228600" indent="-228600" algn="l" defTabSz="914400" rtl="0" eaLnBrk="1" latinLnBrk="0" hangingPunct="1">
-                  <a:lnSpc>
-                    <a:spcPct val="90000"/>
-                  </a:lnSpc>
-                  <a:spcBef>
-                    <a:spcPts val="1000"/>
-                  </a:spcBef>
-                  <a:buFont typeface="Arial" panose="020B0604020202020204" pitchFamily="34" charset="0"/>
-                  <a:buChar char="•"/>
-                  <a:defRPr sz="2800" kern="1200">
-                    <a:solidFill>
-                      <a:schemeClr val="tx1"/>
-                    </a:solidFill>
-                    <a:latin typeface="+mn-lt"/>
-                    <a:ea typeface="+mn-ea"/>
-                    <a:cs typeface="+mn-cs"/>
-                  </a:defRPr>
-                </a:lvl1pPr>
-                <a:lvl2pPr marL="685800" indent="-228600" algn="l" defTabSz="914400" rtl="0" eaLnBrk="1" latinLnBrk="0" hangingPunct="1">
-                  <a:lnSpc>
-                    <a:spcPct val="90000"/>
-                  </a:lnSpc>
-                  <a:spcBef>
-                    <a:spcPts val="500"/>
-                  </a:spcBef>
-                  <a:buFont typeface="Arial" panose="020B0604020202020204" pitchFamily="34" charset="0"/>
-                  <a:buChar char="•"/>
-                  <a:defRPr sz="2400" kern="1200">
-                    <a:solidFill>
-                      <a:schemeClr val="tx1"/>
-                    </a:solidFill>
-                    <a:latin typeface="+mn-lt"/>
-                    <a:ea typeface="+mn-ea"/>
-                    <a:cs typeface="+mn-cs"/>
-                  </a:defRPr>
-                </a:lvl2pPr>
-                <a:lvl3pPr marL="1143000" indent="-228600" algn="l" defTabSz="914400" rtl="0" eaLnBrk="1" latinLnBrk="0" hangingPunct="1">
-                  <a:lnSpc>
-                    <a:spcPct val="90000"/>
-                  </a:lnSpc>
-                  <a:spcBef>
-                    <a:spcPts val="500"/>
-                  </a:spcBef>
-                  <a:buFont typeface="Arial" panose="020B0604020202020204" pitchFamily="34" charset="0"/>
-                  <a:buChar char="•"/>
-                  <a:defRPr sz="2000" kern="1200">
-                    <a:solidFill>
-                      <a:schemeClr val="tx1"/>
-                    </a:solidFill>
-                    <a:latin typeface="+mn-lt"/>
-                    <a:ea typeface="+mn-ea"/>
-                    <a:cs typeface="+mn-cs"/>
-                  </a:defRPr>
-                </a:lvl3pPr>
-                <a:lvl4pPr marL="1600200" indent="-228600" algn="l" defTabSz="914400" rtl="0" eaLnBrk="1" latinLnBrk="0" hangingPunct="1">
-                  <a:lnSpc>
-                    <a:spcPct val="90000"/>
-                  </a:lnSpc>
-                  <a:spcBef>
-                    <a:spcPts val="500"/>
-                  </a:spcBef>
-                  <a:buFont typeface="Arial" panose="020B0604020202020204" pitchFamily="34" charset="0"/>
-                  <a:buChar char="•"/>
-                  <a:defRPr sz="1800" kern="1200">
-                    <a:solidFill>
-                      <a:schemeClr val="tx1"/>
-                    </a:solidFill>
-                    <a:latin typeface="+mn-lt"/>
-                    <a:ea typeface="+mn-ea"/>
-                    <a:cs typeface="+mn-cs"/>
-                  </a:defRPr>
-                </a:lvl4pPr>
-                <a:lvl5pPr marL="2057400" indent="-228600" algn="l" defTabSz="914400" rtl="0" eaLnBrk="1" latinLnBrk="0" hangingPunct="1">
-                  <a:lnSpc>
-                    <a:spcPct val="90000"/>
-                  </a:lnSpc>
-                  <a:spcBef>
-                    <a:spcPts val="500"/>
-                  </a:spcBef>
-                  <a:buFont typeface="Arial" panose="020B0604020202020204" pitchFamily="34" charset="0"/>
-                  <a:buChar char="•"/>
-                  <a:defRPr sz="1800" kern="1200">
-                    <a:solidFill>
-                      <a:schemeClr val="tx1"/>
-                    </a:solidFill>
-                    <a:latin typeface="+mn-lt"/>
-                    <a:ea typeface="+mn-ea"/>
-                    <a:cs typeface="+mn-cs"/>
-                  </a:defRPr>
-                </a:lvl5pPr>
-                <a:lvl6pPr marL="2514600" indent="-228600" algn="l" defTabSz="914400" rtl="0" eaLnBrk="1" latinLnBrk="0" hangingPunct="1">
-                  <a:lnSpc>
-                    <a:spcPct val="90000"/>
-                  </a:lnSpc>
-                  <a:spcBef>
-                    <a:spcPts val="500"/>
-                  </a:spcBef>
-                  <a:buFont typeface="Arial" panose="020B0604020202020204" pitchFamily="34" charset="0"/>
-                  <a:buChar char="•"/>
-                  <a:defRPr sz="1800" kern="1200">
-                    <a:solidFill>
-                      <a:schemeClr val="tx1"/>
-                    </a:solidFill>
-                    <a:latin typeface="+mn-lt"/>
-                    <a:ea typeface="+mn-ea"/>
-                    <a:cs typeface="+mn-cs"/>
-                  </a:defRPr>
-                </a:lvl6pPr>
-                <a:lvl7pPr marL="2971800" indent="-228600" algn="l" defTabSz="914400" rtl="0" eaLnBrk="1" latinLnBrk="0" hangingPunct="1">
-                  <a:lnSpc>
-                    <a:spcPct val="90000"/>
-                  </a:lnSpc>
-                  <a:spcBef>
-                    <a:spcPts val="500"/>
-                  </a:spcBef>
-                  <a:buFont typeface="Arial" panose="020B0604020202020204" pitchFamily="34" charset="0"/>
-                  <a:buChar char="•"/>
-                  <a:defRPr sz="1800" kern="1200">
-                    <a:solidFill>
-                      <a:schemeClr val="tx1"/>
-                    </a:solidFill>
-                    <a:latin typeface="+mn-lt"/>
-                    <a:ea typeface="+mn-ea"/>
-                    <a:cs typeface="+mn-cs"/>
-                  </a:defRPr>
-                </a:lvl7pPr>
-                <a:lvl8pPr marL="3429000" indent="-228600" algn="l" defTabSz="914400" rtl="0" eaLnBrk="1" latinLnBrk="0" hangingPunct="1">
-                  <a:lnSpc>
-                    <a:spcPct val="90000"/>
-                  </a:lnSpc>
-                  <a:spcBef>
-                    <a:spcPts val="500"/>
-                  </a:spcBef>
-                  <a:buFont typeface="Arial" panose="020B0604020202020204" pitchFamily="34" charset="0"/>
-                  <a:buChar char="•"/>
-                  <a:defRPr sz="1800" kern="1200">
-                    <a:solidFill>
-                      <a:schemeClr val="tx1"/>
-                    </a:solidFill>
-                    <a:latin typeface="+mn-lt"/>
-                    <a:ea typeface="+mn-ea"/>
-                    <a:cs typeface="+mn-cs"/>
-                  </a:defRPr>
-                </a:lvl8pPr>
-                <a:lvl9pPr marL="3886200" indent="-228600" algn="l" defTabSz="914400" rtl="0" eaLnBrk="1" latinLnBrk="0" hangingPunct="1">
-                  <a:lnSpc>
-                    <a:spcPct val="90000"/>
-                  </a:lnSpc>
-                  <a:spcBef>
-                    <a:spcPts val="500"/>
-                  </a:spcBef>
-                  <a:buFont typeface="Arial" panose="020B0604020202020204" pitchFamily="34" charset="0"/>
-                  <a:buChar char="•"/>
-                  <a:defRPr sz="1800" kern="1200">
-                    <a:solidFill>
-                      <a:schemeClr val="tx1"/>
-                    </a:solidFill>
-                    <a:latin typeface="+mn-lt"/>
-                    <a:ea typeface="+mn-ea"/>
-                    <a:cs typeface="+mn-cs"/>
-                  </a:defRPr>
-                </a:lvl9pPr>
-              </a:lstStyle>
-              <a:p>
-                <a:pPr marL="0" marR="0" lvl="0" indent="-228600" algn="l" defTabSz="914400" rtl="0" eaLnBrk="1" fontAlgn="auto" latinLnBrk="0" hangingPunct="1">
-                  <a:lnSpc>
-                    <a:spcPct val="90000"/>
-                  </a:lnSpc>
-                  <a:spcBef>
-                    <a:spcPts val="1000"/>
-                  </a:spcBef>
-                  <a:spcAft>
-                    <a:spcPts val="0"/>
-                  </a:spcAft>
-                  <a:buClrTx/>
-                  <a:buSzTx/>
-                  <a:buFont typeface="Arial" panose="020B0604020202020204" pitchFamily="34" charset="0"/>
-                  <a:buChar char="•"/>
-                  <a:tabLst/>
-                  <a:defRPr/>
-                </a:pPr>
-                <a:endParaRPr kumimoji="0" lang="en-US" sz="2000" b="0" i="0" u="none" strike="noStrike" kern="1200" cap="none" spc="0" normalizeH="0" baseline="0" noProof="0" dirty="0">
-                  <a:ln>
-                    <a:noFill/>
-                  </a:ln>
-                  <a:solidFill>
-                    <a:prstClr val="black"/>
-                  </a:solidFill>
-                  <a:effectLst/>
-                  <a:uLnTx/>
-                  <a:uFillTx/>
-                  <a:latin typeface="Calibri" panose="020F0502020204030204"/>
-                  <a:ea typeface="+mn-ea"/>
-                  <a:cs typeface="+mn-cs"/>
-                </a:endParaRPr>
-              </a:p>
-              <a:p>
-                <a:pPr marL="0" marR="0" lvl="0" indent="-228600" algn="l" defTabSz="914400" rtl="0" eaLnBrk="1" fontAlgn="auto" latinLnBrk="0" hangingPunct="1">
-                  <a:lnSpc>
-                    <a:spcPct val="90000"/>
-                  </a:lnSpc>
-                  <a:spcBef>
-                    <a:spcPts val="1000"/>
-                  </a:spcBef>
-                  <a:spcAft>
-                    <a:spcPts val="0"/>
-                  </a:spcAft>
-                  <a:buClrTx/>
-                  <a:buSzTx/>
-                  <a:buFont typeface="Arial" panose="020B0604020202020204" pitchFamily="34" charset="0"/>
-                  <a:buChar char="•"/>
-                  <a:tabLst/>
-                  <a:defRPr/>
-                </a:pPr>
-                <a:r>
-                  <a:rPr kumimoji="0" lang="en-US" sz="2400" b="0" i="0" u="none" strike="noStrike" kern="1200" cap="none" spc="0" normalizeH="0" baseline="0" noProof="0" dirty="0">
-                    <a:ln>
-                      <a:noFill/>
-                    </a:ln>
-                    <a:solidFill>
-                      <a:prstClr val="black"/>
-                    </a:solidFill>
-                    <a:effectLst/>
-                    <a:uLnTx/>
-                    <a:uFillTx/>
-                    <a:latin typeface="Calibri" panose="020F0502020204030204"/>
-                    <a:ea typeface="+mn-ea"/>
-                    <a:cs typeface="+mn-cs"/>
-                  </a:rPr>
-                  <a:t>Roll a six-sided die </a:t>
-                </a:r>
-                <a14:m>
-                  <m:oMath xmlns:m="http://schemas.openxmlformats.org/officeDocument/2006/math">
-                    <m:r>
-                      <a:rPr kumimoji="0" lang="en-US" sz="2400" b="0" i="1" u="none" strike="noStrike" kern="1200" cap="none" spc="0" normalizeH="0" baseline="0" noProof="0" smtClean="0">
-                        <a:ln>
-                          <a:noFill/>
-                        </a:ln>
-                        <a:solidFill>
-                          <a:prstClr val="black"/>
-                        </a:solidFill>
-                        <a:effectLst/>
-                        <a:uLnTx/>
-                        <a:uFillTx/>
-                        <a:latin typeface="Cambria Math" panose="02040503050406030204" pitchFamily="18" charset="0"/>
-                        <a:ea typeface="+mn-ea"/>
-                        <a:cs typeface="+mn-cs"/>
-                      </a:rPr>
-                      <m:t>𝑛</m:t>
-                    </m:r>
-                    <m:r>
-                      <a:rPr kumimoji="0" lang="en-US" sz="2400" b="0" i="1" u="none" strike="noStrike" kern="1200" cap="none" spc="0" normalizeH="0" baseline="0" noProof="0" smtClean="0">
-                        <a:ln>
-                          <a:noFill/>
-                        </a:ln>
-                        <a:solidFill>
-                          <a:prstClr val="black"/>
-                        </a:solidFill>
-                        <a:effectLst/>
-                        <a:uLnTx/>
-                        <a:uFillTx/>
-                        <a:latin typeface="Cambria Math" panose="02040503050406030204" pitchFamily="18" charset="0"/>
-                        <a:ea typeface="+mn-ea"/>
-                        <a:cs typeface="+mn-cs"/>
-                      </a:rPr>
-                      <m:t>=10</m:t>
-                    </m:r>
-                  </m:oMath>
-                </a14:m>
-                <a:r>
-                  <a:rPr kumimoji="0" lang="en-US" sz="2400" b="0" i="0" u="none" strike="noStrike" kern="1200" cap="none" spc="0" normalizeH="0" baseline="0" noProof="0" dirty="0">
-                    <a:ln>
-                      <a:noFill/>
-                    </a:ln>
-                    <a:solidFill>
-                      <a:prstClr val="black"/>
-                    </a:solidFill>
-                    <a:effectLst/>
-                    <a:uLnTx/>
-                    <a:uFillTx/>
-                    <a:latin typeface="Calibri" panose="020F0502020204030204"/>
-                    <a:ea typeface="+mn-ea"/>
-                    <a:cs typeface="+mn-cs"/>
-                  </a:rPr>
-                  <a:t> times and record the number rolled each time</a:t>
-                </a:r>
-                <a:endParaRPr kumimoji="0" lang="en-US" sz="2000" b="0" i="0" u="none" strike="noStrike" kern="1200" cap="none" spc="0" normalizeH="0" baseline="0" noProof="0" dirty="0">
-                  <a:ln>
-                    <a:noFill/>
-                  </a:ln>
-                  <a:solidFill>
-                    <a:prstClr val="black"/>
-                  </a:solidFill>
-                  <a:effectLst/>
-                  <a:uLnTx/>
-                  <a:uFillTx/>
-                  <a:latin typeface="Calibri" panose="020F0502020204030204"/>
-                  <a:ea typeface="+mn-ea"/>
-                  <a:cs typeface="+mn-cs"/>
-                </a:endParaRPr>
-              </a:p>
-              <a:p>
-                <a:pPr marL="0" marR="0" lvl="0" indent="-228600" algn="l" defTabSz="914400" rtl="0" eaLnBrk="1" fontAlgn="auto" latinLnBrk="0" hangingPunct="1">
-                  <a:lnSpc>
-                    <a:spcPct val="90000"/>
-                  </a:lnSpc>
-                  <a:spcBef>
-                    <a:spcPts val="1000"/>
-                  </a:spcBef>
-                  <a:spcAft>
-                    <a:spcPts val="0"/>
-                  </a:spcAft>
-                  <a:buClrTx/>
-                  <a:buSzTx/>
-                  <a:buFont typeface="Arial" panose="020B0604020202020204" pitchFamily="34" charset="0"/>
-                  <a:buChar char="•"/>
-                  <a:tabLst/>
-                  <a:defRPr/>
-                </a:pPr>
-                <a:endParaRPr kumimoji="0" lang="en-US" sz="2000" b="0" i="0" u="none" strike="noStrike" kern="1200" cap="none" spc="0" normalizeH="0" baseline="0" noProof="0" dirty="0">
-                  <a:ln>
-                    <a:noFill/>
-                  </a:ln>
-                  <a:solidFill>
-                    <a:prstClr val="black"/>
-                  </a:solidFill>
-                  <a:effectLst/>
-                  <a:uLnTx/>
-                  <a:uFillTx/>
-                  <a:latin typeface="Calibri" panose="020F0502020204030204"/>
-                  <a:ea typeface="+mn-ea"/>
-                  <a:cs typeface="+mn-cs"/>
-                </a:endParaRPr>
-              </a:p>
-              <a:p>
-                <a:pPr marL="0" marR="0" lvl="0" indent="-228600" algn="l" defTabSz="914400" rtl="0" eaLnBrk="1" fontAlgn="auto" latinLnBrk="0" hangingPunct="1">
-                  <a:lnSpc>
-                    <a:spcPct val="90000"/>
-                  </a:lnSpc>
-                  <a:spcBef>
-                    <a:spcPts val="1000"/>
-                  </a:spcBef>
-                  <a:spcAft>
-                    <a:spcPts val="0"/>
-                  </a:spcAft>
-                  <a:buClrTx/>
-                  <a:buSzTx/>
-                  <a:buFont typeface="Arial" panose="020B0604020202020204" pitchFamily="34" charset="0"/>
-                  <a:buChar char="•"/>
-                  <a:tabLst/>
-                  <a:defRPr/>
-                </a:pPr>
-                <a:r>
-                  <a:rPr kumimoji="0" lang="en-US" sz="2400" b="0" i="0" u="none" strike="noStrike" kern="1200" cap="none" spc="0" normalizeH="0" baseline="0" noProof="0" dirty="0">
-                    <a:ln>
-                      <a:noFill/>
-                    </a:ln>
-                    <a:solidFill>
-                      <a:prstClr val="black"/>
-                    </a:solidFill>
-                    <a:effectLst/>
-                    <a:uLnTx/>
-                    <a:uFillTx/>
-                    <a:latin typeface="Calibri" panose="020F0502020204030204"/>
-                    <a:ea typeface="+mn-ea"/>
-                    <a:cs typeface="+mn-cs"/>
-                  </a:rPr>
-                  <a:t>Data = 1,2,3,3,4,4,4,5,6,6</a:t>
-                </a:r>
-              </a:p>
-              <a:p>
-                <a:pPr marL="0" marR="0" lvl="0" indent="-228600" algn="l" defTabSz="914400" rtl="0" eaLnBrk="1" fontAlgn="auto" latinLnBrk="0" hangingPunct="1">
-                  <a:lnSpc>
-                    <a:spcPct val="90000"/>
-                  </a:lnSpc>
-                  <a:spcBef>
-                    <a:spcPts val="1000"/>
-                  </a:spcBef>
-                  <a:spcAft>
-                    <a:spcPts val="0"/>
-                  </a:spcAft>
-                  <a:buClrTx/>
-                  <a:buSzTx/>
-                  <a:buFont typeface="Arial" panose="020B0604020202020204" pitchFamily="34" charset="0"/>
-                  <a:buChar char="•"/>
-                  <a:tabLst/>
-                  <a:defRPr/>
-                </a:pPr>
-                <a:endParaRPr lang="en-US" sz="2400" dirty="0">
-                  <a:solidFill>
-                    <a:prstClr val="black"/>
-                  </a:solidFill>
-                  <a:latin typeface="Calibri" panose="020F0502020204030204"/>
-                </a:endParaRPr>
-              </a:p>
-              <a:p>
-                <a:pPr marL="0" marR="0" lvl="0" indent="-228600" algn="l" defTabSz="914400" rtl="0" eaLnBrk="1" fontAlgn="auto" latinLnBrk="0" hangingPunct="1">
-                  <a:lnSpc>
-                    <a:spcPct val="90000"/>
-                  </a:lnSpc>
-                  <a:spcBef>
-                    <a:spcPts val="1000"/>
-                  </a:spcBef>
-                  <a:spcAft>
-                    <a:spcPts val="0"/>
-                  </a:spcAft>
-                  <a:buClrTx/>
-                  <a:buSzTx/>
-                  <a:buFont typeface="Arial" panose="020B0604020202020204" pitchFamily="34" charset="0"/>
-                  <a:buChar char="•"/>
-                  <a:tabLst/>
-                  <a:defRPr/>
-                </a:pPr>
-                <a:r>
-                  <a:rPr kumimoji="0" lang="en-US" sz="2400" b="0" i="0" u="none" strike="noStrike" kern="1200" cap="none" spc="0" normalizeH="0" baseline="0" noProof="0" dirty="0">
-                    <a:ln>
-                      <a:noFill/>
-                    </a:ln>
-                    <a:solidFill>
-                      <a:prstClr val="black"/>
-                    </a:solidFill>
-                    <a:effectLst/>
-                    <a:uLnTx/>
-                    <a:uFillTx/>
-                    <a:latin typeface="Calibri" panose="020F0502020204030204"/>
-                    <a:ea typeface="+mn-ea"/>
-                    <a:cs typeface="+mn-cs"/>
-                  </a:rPr>
-                  <a:t>Mean = 3.8</a:t>
-                </a:r>
-                <a:endParaRPr kumimoji="0" lang="en-US" sz="2000" b="0" i="0" u="none" strike="noStrike" kern="1200" cap="none" spc="0" normalizeH="0" baseline="0" noProof="0" dirty="0">
-                  <a:ln>
-                    <a:noFill/>
-                  </a:ln>
-                  <a:solidFill>
-                    <a:prstClr val="black"/>
-                  </a:solidFill>
-                  <a:effectLst/>
-                  <a:uLnTx/>
-                  <a:uFillTx/>
-                  <a:latin typeface="Calibri" panose="020F0502020204030204"/>
-                  <a:ea typeface="+mn-ea"/>
-                  <a:cs typeface="+mn-cs"/>
-                </a:endParaRPr>
-              </a:p>
-              <a:p>
-                <a:pPr marL="228600" marR="0" lvl="0" indent="-228600" algn="l" defTabSz="914400" rtl="0" eaLnBrk="1" fontAlgn="auto" latinLnBrk="0" hangingPunct="1">
-                  <a:lnSpc>
-                    <a:spcPct val="90000"/>
-                  </a:lnSpc>
-                  <a:spcBef>
-                    <a:spcPts val="1000"/>
-                  </a:spcBef>
-                  <a:spcAft>
-                    <a:spcPts val="0"/>
-                  </a:spcAft>
-                  <a:buClrTx/>
-                  <a:buSzTx/>
-                  <a:buFont typeface="Arial" panose="020B0604020202020204" pitchFamily="34" charset="0"/>
-                  <a:buChar char="•"/>
-                  <a:tabLst/>
-                  <a:defRPr/>
-                </a:pPr>
-                <a:endParaRPr kumimoji="0" lang="en-US" sz="2000" b="0" i="0" u="none" strike="noStrike" kern="1200" cap="none" spc="0" normalizeH="0" baseline="0" noProof="0" dirty="0">
-                  <a:ln>
-                    <a:noFill/>
-                  </a:ln>
-                  <a:solidFill>
-                    <a:prstClr val="black"/>
-                  </a:solidFill>
-                  <a:effectLst/>
-                  <a:uLnTx/>
-                  <a:uFillTx/>
-                  <a:latin typeface="Calibri" panose="020F0502020204030204"/>
-                  <a:ea typeface="+mn-ea"/>
-                  <a:cs typeface="+mn-cs"/>
-                </a:endParaRPr>
-              </a:p>
-              <a:p>
-                <a:pPr marL="228600" marR="0" lvl="0" indent="-228600" algn="l" defTabSz="914400" rtl="0" eaLnBrk="1" fontAlgn="auto" latinLnBrk="0" hangingPunct="1">
-                  <a:lnSpc>
-                    <a:spcPct val="90000"/>
-                  </a:lnSpc>
-                  <a:spcBef>
-                    <a:spcPts val="1000"/>
-                  </a:spcBef>
-                  <a:spcAft>
-                    <a:spcPts val="0"/>
-                  </a:spcAft>
-                  <a:buClrTx/>
-                  <a:buSzTx/>
-                  <a:buFont typeface="Arial" panose="020B0604020202020204" pitchFamily="34" charset="0"/>
-                  <a:buChar char="•"/>
-                  <a:tabLst/>
-                  <a:defRPr/>
-                </a:pPr>
-                <a:endParaRPr kumimoji="0" lang="en-US" sz="2000" b="0" i="0" u="none" strike="noStrike" kern="1200" cap="none" spc="0" normalizeH="0" baseline="0" noProof="0" dirty="0">
-                  <a:ln>
-                    <a:noFill/>
-                  </a:ln>
-                  <a:solidFill>
-                    <a:prstClr val="black"/>
-                  </a:solidFill>
-                  <a:effectLst/>
-                  <a:uLnTx/>
-                  <a:uFillTx/>
-                  <a:latin typeface="Calibri" panose="020F0502020204030204"/>
-                  <a:ea typeface="+mn-ea"/>
-                  <a:cs typeface="+mn-cs"/>
-                </a:endParaRPr>
-              </a:p>
-              <a:p>
-                <a:pPr marL="228600" marR="0" lvl="0" indent="-228600" algn="l" defTabSz="914400" rtl="0" eaLnBrk="1" fontAlgn="auto" latinLnBrk="0" hangingPunct="1">
-                  <a:lnSpc>
-                    <a:spcPct val="90000"/>
-                  </a:lnSpc>
-                  <a:spcBef>
-                    <a:spcPts val="1000"/>
-                  </a:spcBef>
-                  <a:spcAft>
-                    <a:spcPts val="0"/>
-                  </a:spcAft>
-                  <a:buClrTx/>
-                  <a:buSzTx/>
-                  <a:buFont typeface="Arial" panose="020B0604020202020204" pitchFamily="34" charset="0"/>
-                  <a:buChar char="•"/>
-                  <a:tabLst/>
-                  <a:defRPr/>
-                </a:pPr>
-                <a:endParaRPr kumimoji="0" lang="en-US" sz="2000" b="0" i="0" u="none" strike="noStrike" kern="1200" cap="none" spc="0" normalizeH="0" baseline="0" noProof="0" dirty="0">
-                  <a:ln>
-                    <a:noFill/>
-                  </a:ln>
-                  <a:solidFill>
-                    <a:prstClr val="black"/>
-                  </a:solidFill>
-                  <a:effectLst/>
-                  <a:uLnTx/>
-                  <a:uFillTx/>
-                  <a:latin typeface="Calibri" panose="020F0502020204030204"/>
-                  <a:ea typeface="+mn-ea"/>
-                  <a:cs typeface="+mn-cs"/>
-                </a:endParaRPr>
-              </a:p>
-            </p:txBody>
-          </p:sp>
-        </mc:Choice>
-        <mc:Fallback xmlns="">
-          <p:sp>
-            <p:nvSpPr>
-              <p:cNvPr id="4" name="Content Placeholder 2">
-                <a:extLst>
-                  <a:ext uri="{FF2B5EF4-FFF2-40B4-BE49-F238E27FC236}">
-                    <a16:creationId xmlns:a16="http://schemas.microsoft.com/office/drawing/2014/main" id="{C933D906-CF81-5AD4-2902-D9DD0E0EF8B7}"/>
-                  </a:ext>
-                </a:extLst>
-              </p:cNvPr>
-              <p:cNvSpPr txBox="1">
-                <a:spLocks noRot="1" noChangeAspect="1" noMove="1" noResize="1" noEditPoints="1" noAdjustHandles="1" noChangeArrowheads="1" noChangeShapeType="1" noTextEdit="1"/>
-              </p:cNvSpPr>
-              <p:nvPr/>
-            </p:nvSpPr>
-            <p:spPr>
-              <a:xfrm>
-                <a:off x="838199" y="2686323"/>
-                <a:ext cx="4783697" cy="3433583"/>
-              </a:xfrm>
-              <a:prstGeom prst="rect">
-                <a:avLst/>
-              </a:prstGeom>
-              <a:blipFill>
-                <a:blip r:embed="rId3"/>
-                <a:stretch>
-                  <a:fillRect l="-1911"/>
-                </a:stretch>
-              </a:blipFill>
-            </p:spPr>
-            <p:txBody>
-              <a:bodyPr/>
-              <a:lstStyle/>
-              <a:p>
-                <a:r>
-                  <a:rPr lang="en-US">
-                    <a:noFill/>
-                  </a:rPr>
-                  <a:t> </a:t>
-                </a:r>
-              </a:p>
-            </p:txBody>
-          </p:sp>
-        </mc:Fallback>
-      </mc:AlternateContent>
-      <p:pic>
-        <p:nvPicPr>
-          <p:cNvPr id="5" name="Picture 2" descr="Beer die - EUSwiki">
-            <a:extLst>
-              <a:ext uri="{FF2B5EF4-FFF2-40B4-BE49-F238E27FC236}">
-                <a16:creationId xmlns:a16="http://schemas.microsoft.com/office/drawing/2014/main" id="{98F16938-2ED7-9FB6-1FC2-1BF322196DF8}"/>
-              </a:ext>
-            </a:extLst>
-          </p:cNvPr>
-          <p:cNvPicPr>
-            <a:picLocks noChangeAspect="1" noChangeArrowheads="1"/>
-          </p:cNvPicPr>
-          <p:nvPr/>
-        </p:nvPicPr>
-        <p:blipFill>
-          <a:blip r:embed="rId4">
-            <a:extLst>
-              <a:ext uri="{28A0092B-C50C-407E-A947-70E740481C1C}">
-                <a14:useLocalDpi xmlns:a14="http://schemas.microsoft.com/office/drawing/2010/main" val="0"/>
-              </a:ext>
-            </a:extLst>
-          </a:blip>
-          <a:stretch>
-            <a:fillRect/>
-          </a:stretch>
-        </p:blipFill>
-        <p:spPr bwMode="auto">
-          <a:xfrm>
-            <a:off x="8276159" y="2927927"/>
-            <a:ext cx="3077639" cy="3124507"/>
-          </a:xfrm>
-          <a:prstGeom prst="rect">
-            <a:avLst/>
-          </a:prstGeom>
-          <a:noFill/>
-          <a:extLst>
-            <a:ext uri="{909E8E84-426E-40DD-AFC4-6F175D3DCCD1}">
-              <a14:hiddenFill xmlns:a14="http://schemas.microsoft.com/office/drawing/2010/main">
-                <a:solidFill>
-                  <a:srgbClr val="FFFFFF"/>
-                </a:solidFill>
-              </a14:hiddenFill>
-            </a:ext>
-          </a:extLst>
-        </p:spPr>
-      </p:pic>
-    </p:spTree>
-    <p:extLst>
-      <p:ext uri="{BB962C8B-B14F-4D97-AF65-F5344CB8AC3E}">
-        <p14:creationId xmlns:p14="http://schemas.microsoft.com/office/powerpoint/2010/main" val="925779086"/>
       </p:ext>
     </p:extLst>
   </p:cSld>
@@ -11421,13 +7622,13 @@
                       <a:rPr lang="en-US" i="1" smtClean="0">
                         <a:latin typeface="Cambria Math" panose="02040503050406030204" pitchFamily="18" charset="0"/>
                       </a:rPr>
-                      <m:t>={−1.49, −0.65, −0.6,</m:t>
+                      <m:t>={−1.49, −0.65, −0.6, −0.</m:t>
                     </m:r>
                     <m:r>
                       <a:rPr lang="en-US" i="1">
                         <a:latin typeface="Cambria Math" panose="02040503050406030204" pitchFamily="18" charset="0"/>
                       </a:rPr>
-                      <m:t> −0.54, −0.45, 0.01, 0.17, 0.27, 0.51, 1.34</m:t>
+                      <m:t>54, −0.45, 0.01, 0.17, 0.27, 0.51, 1.34</m:t>
                     </m:r>
                     <m:r>
                       <a:rPr lang="en-US" b="0" i="0" smtClean="0">
@@ -12742,13 +8943,13 @@
                       <a:rPr lang="en-US" b="0" i="1" smtClean="0">
                         <a:latin typeface="Cambria Math" panose="02040503050406030204" pitchFamily="18" charset="0"/>
                       </a:rPr>
-                      <m:t>={1, 3, 5, 5, </m:t>
+                      <m:t>={1, 3, 5, 5, 6, 7</m:t>
                     </m:r>
                     <m:r>
                       <a:rPr lang="en-US" i="1">
                         <a:latin typeface="Cambria Math" panose="02040503050406030204" pitchFamily="18" charset="0"/>
                       </a:rPr>
-                      <m:t>6, 7, 7, 8}</m:t>
+                      <m:t>, 7, 8}</m:t>
                     </m:r>
                   </m:oMath>
                 </a14:m>

</xml_diff>